<commit_message>
add workshop data diagram
</commit_message>
<xml_diff>
--- a/images/DataDiagram.pptx
+++ b/images/DataDiagram.pptx
@@ -2,12 +2,13 @@
 <file path=ppt/presentation.xml><?xml version="1.0" encoding="utf-8"?>
 <p:presentation xmlns:a="http://schemas.openxmlformats.org/drawingml/2006/main" xmlns:r="http://schemas.openxmlformats.org/officeDocument/2006/relationships" xmlns:p="http://schemas.openxmlformats.org/presentationml/2006/main" saveSubsetFonts="1">
   <p:sldMasterIdLst>
-    <p:sldMasterId id="2147483660" r:id="rId1"/>
+    <p:sldMasterId id="2147483672" r:id="rId1"/>
   </p:sldMasterIdLst>
   <p:sldIdLst>
     <p:sldId id="256" r:id="rId2"/>
+    <p:sldId id="257" r:id="rId3"/>
   </p:sldIdLst>
-  <p:sldSz cx="6858000" cy="12192000"/>
+  <p:sldSz cx="9144000" cy="6858000" type="letter"/>
   <p:notesSz cx="6858000" cy="9144000"/>
   <p:defaultTextStyle>
     <a:defPPr>
@@ -141,15 +142,15 @@
         </p:nvSpPr>
         <p:spPr>
           <a:xfrm>
-            <a:off x="514350" y="1995312"/>
-            <a:ext cx="5829300" cy="4244622"/>
+            <a:off x="685800" y="1122363"/>
+            <a:ext cx="7772400" cy="2387600"/>
           </a:xfrm>
         </p:spPr>
         <p:txBody>
           <a:bodyPr anchor="b"/>
           <a:lstStyle>
             <a:lvl1pPr algn="ctr">
-              <a:defRPr sz="4500"/>
+              <a:defRPr sz="6000"/>
             </a:lvl1pPr>
           </a:lstStyle>
           <a:p>
@@ -173,8 +174,8 @@
         </p:nvSpPr>
         <p:spPr>
           <a:xfrm>
-            <a:off x="857250" y="6403623"/>
-            <a:ext cx="5143500" cy="2943577"/>
+            <a:off x="1143000" y="3602038"/>
+            <a:ext cx="6858000" cy="1655762"/>
           </a:xfrm>
         </p:spPr>
         <p:txBody>
@@ -182,39 +183,39 @@
           <a:lstStyle>
             <a:lvl1pPr marL="0" indent="0" algn="ctr">
               <a:buNone/>
+              <a:defRPr sz="2400"/>
+            </a:lvl1pPr>
+            <a:lvl2pPr marL="457200" indent="0" algn="ctr">
+              <a:buNone/>
+              <a:defRPr sz="2000"/>
+            </a:lvl2pPr>
+            <a:lvl3pPr marL="914400" indent="0" algn="ctr">
+              <a:buNone/>
               <a:defRPr sz="1800"/>
-            </a:lvl1pPr>
-            <a:lvl2pPr marL="342900" indent="0" algn="ctr">
-              <a:buNone/>
-              <a:defRPr sz="1500"/>
-            </a:lvl2pPr>
-            <a:lvl3pPr marL="685800" indent="0" algn="ctr">
-              <a:buNone/>
-              <a:defRPr sz="1350"/>
             </a:lvl3pPr>
-            <a:lvl4pPr marL="1028700" indent="0" algn="ctr">
-              <a:buNone/>
-              <a:defRPr sz="1200"/>
+            <a:lvl4pPr marL="1371600" indent="0" algn="ctr">
+              <a:buNone/>
+              <a:defRPr sz="1600"/>
             </a:lvl4pPr>
-            <a:lvl5pPr marL="1371600" indent="0" algn="ctr">
-              <a:buNone/>
-              <a:defRPr sz="1200"/>
+            <a:lvl5pPr marL="1828800" indent="0" algn="ctr">
+              <a:buNone/>
+              <a:defRPr sz="1600"/>
             </a:lvl5pPr>
-            <a:lvl6pPr marL="1714500" indent="0" algn="ctr">
-              <a:buNone/>
-              <a:defRPr sz="1200"/>
+            <a:lvl6pPr marL="2286000" indent="0" algn="ctr">
+              <a:buNone/>
+              <a:defRPr sz="1600"/>
             </a:lvl6pPr>
-            <a:lvl7pPr marL="2057400" indent="0" algn="ctr">
-              <a:buNone/>
-              <a:defRPr sz="1200"/>
+            <a:lvl7pPr marL="2743200" indent="0" algn="ctr">
+              <a:buNone/>
+              <a:defRPr sz="1600"/>
             </a:lvl7pPr>
-            <a:lvl8pPr marL="2400300" indent="0" algn="ctr">
-              <a:buNone/>
-              <a:defRPr sz="1200"/>
+            <a:lvl8pPr marL="3200400" indent="0" algn="ctr">
+              <a:buNone/>
+              <a:defRPr sz="1600"/>
             </a:lvl8pPr>
-            <a:lvl9pPr marL="2743200" indent="0" algn="ctr">
-              <a:buNone/>
-              <a:defRPr sz="1200"/>
+            <a:lvl9pPr marL="3657600" indent="0" algn="ctr">
+              <a:buNone/>
+              <a:defRPr sz="1600"/>
             </a:lvl9pPr>
           </a:lstStyle>
           <a:p>
@@ -243,7 +244,7 @@
           <a:p>
             <a:fld id="{75529F3F-3E84-487A-AFD3-E6472C0E63DF}" type="datetimeFigureOut">
               <a:rPr lang="en-US" smtClean="0"/>
-              <a:t>10/21/2019</a:t>
+              <a:t>10/28/2019</a:t>
             </a:fld>
             <a:endParaRPr lang="en-US"/>
           </a:p>
@@ -294,7 +295,7 @@
     </p:spTree>
     <p:extLst>
       <p:ext uri="{BB962C8B-B14F-4D97-AF65-F5344CB8AC3E}">
-        <p14:creationId xmlns:p14="http://schemas.microsoft.com/office/powerpoint/2010/main" val="2454859038"/>
+        <p14:creationId xmlns:p14="http://schemas.microsoft.com/office/powerpoint/2010/main" val="1313053078"/>
       </p:ext>
     </p:extLst>
   </p:cSld>
@@ -413,7 +414,7 @@
           <a:p>
             <a:fld id="{75529F3F-3E84-487A-AFD3-E6472C0E63DF}" type="datetimeFigureOut">
               <a:rPr lang="en-US" smtClean="0"/>
-              <a:t>10/21/2019</a:t>
+              <a:t>10/28/2019</a:t>
             </a:fld>
             <a:endParaRPr lang="en-US"/>
           </a:p>
@@ -464,7 +465,7 @@
     </p:spTree>
     <p:extLst>
       <p:ext uri="{BB962C8B-B14F-4D97-AF65-F5344CB8AC3E}">
-        <p14:creationId xmlns:p14="http://schemas.microsoft.com/office/powerpoint/2010/main" val="32347240"/>
+        <p14:creationId xmlns:p14="http://schemas.microsoft.com/office/powerpoint/2010/main" val="1928827535"/>
       </p:ext>
     </p:extLst>
   </p:cSld>
@@ -503,8 +504,8 @@
         </p:nvSpPr>
         <p:spPr>
           <a:xfrm>
-            <a:off x="4907757" y="649111"/>
-            <a:ext cx="1478756" cy="10332156"/>
+            <a:off x="6543675" y="365125"/>
+            <a:ext cx="1971675" cy="5811838"/>
           </a:xfrm>
         </p:spPr>
         <p:txBody>
@@ -531,8 +532,8 @@
         </p:nvSpPr>
         <p:spPr>
           <a:xfrm>
-            <a:off x="471488" y="649111"/>
-            <a:ext cx="4350544" cy="10332156"/>
+            <a:off x="628650" y="365125"/>
+            <a:ext cx="5800725" cy="5811838"/>
           </a:xfrm>
         </p:spPr>
         <p:txBody>
@@ -593,7 +594,7 @@
           <a:p>
             <a:fld id="{75529F3F-3E84-487A-AFD3-E6472C0E63DF}" type="datetimeFigureOut">
               <a:rPr lang="en-US" smtClean="0"/>
-              <a:t>10/21/2019</a:t>
+              <a:t>10/28/2019</a:t>
             </a:fld>
             <a:endParaRPr lang="en-US"/>
           </a:p>
@@ -644,7 +645,7 @@
     </p:spTree>
     <p:extLst>
       <p:ext uri="{BB962C8B-B14F-4D97-AF65-F5344CB8AC3E}">
-        <p14:creationId xmlns:p14="http://schemas.microsoft.com/office/powerpoint/2010/main" val="2377786387"/>
+        <p14:creationId xmlns:p14="http://schemas.microsoft.com/office/powerpoint/2010/main" val="3015199636"/>
       </p:ext>
     </p:extLst>
   </p:cSld>
@@ -763,7 +764,7 @@
           <a:p>
             <a:fld id="{75529F3F-3E84-487A-AFD3-E6472C0E63DF}" type="datetimeFigureOut">
               <a:rPr lang="en-US" smtClean="0"/>
-              <a:t>10/21/2019</a:t>
+              <a:t>10/28/2019</a:t>
             </a:fld>
             <a:endParaRPr lang="en-US"/>
           </a:p>
@@ -814,7 +815,7 @@
     </p:spTree>
     <p:extLst>
       <p:ext uri="{BB962C8B-B14F-4D97-AF65-F5344CB8AC3E}">
-        <p14:creationId xmlns:p14="http://schemas.microsoft.com/office/powerpoint/2010/main" val="2339774321"/>
+        <p14:creationId xmlns:p14="http://schemas.microsoft.com/office/powerpoint/2010/main" val="15548783"/>
       </p:ext>
     </p:extLst>
   </p:cSld>
@@ -853,15 +854,15 @@
         </p:nvSpPr>
         <p:spPr>
           <a:xfrm>
-            <a:off x="467916" y="3039537"/>
-            <a:ext cx="5915025" cy="5071532"/>
+            <a:off x="623888" y="1709739"/>
+            <a:ext cx="7886700" cy="2852737"/>
           </a:xfrm>
         </p:spPr>
         <p:txBody>
           <a:bodyPr anchor="b"/>
           <a:lstStyle>
             <a:lvl1pPr>
-              <a:defRPr sz="4500"/>
+              <a:defRPr sz="6000"/>
             </a:lvl1pPr>
           </a:lstStyle>
           <a:p>
@@ -885,8 +886,8 @@
         </p:nvSpPr>
         <p:spPr>
           <a:xfrm>
-            <a:off x="467916" y="8159048"/>
-            <a:ext cx="5915025" cy="2666999"/>
+            <a:off x="623888" y="4589464"/>
+            <a:ext cx="7886700" cy="1500187"/>
           </a:xfrm>
         </p:spPr>
         <p:txBody>
@@ -894,15 +895,15 @@
           <a:lstStyle>
             <a:lvl1pPr marL="0" indent="0">
               <a:buNone/>
-              <a:defRPr sz="1800">
+              <a:defRPr sz="2400">
                 <a:solidFill>
                   <a:schemeClr val="tx1"/>
                 </a:solidFill>
               </a:defRPr>
             </a:lvl1pPr>
-            <a:lvl2pPr marL="342900" indent="0">
-              <a:buNone/>
-              <a:defRPr sz="1500">
+            <a:lvl2pPr marL="457200" indent="0">
+              <a:buNone/>
+              <a:defRPr sz="2000">
                 <a:solidFill>
                   <a:schemeClr val="tx1">
                     <a:tint val="75000"/>
@@ -910,9 +911,9 @@
                 </a:solidFill>
               </a:defRPr>
             </a:lvl2pPr>
-            <a:lvl3pPr marL="685800" indent="0">
-              <a:buNone/>
-              <a:defRPr sz="1350">
+            <a:lvl3pPr marL="914400" indent="0">
+              <a:buNone/>
+              <a:defRPr sz="1800">
                 <a:solidFill>
                   <a:schemeClr val="tx1">
                     <a:tint val="75000"/>
@@ -920,9 +921,9 @@
                 </a:solidFill>
               </a:defRPr>
             </a:lvl3pPr>
-            <a:lvl4pPr marL="1028700" indent="0">
-              <a:buNone/>
-              <a:defRPr sz="1200">
+            <a:lvl4pPr marL="1371600" indent="0">
+              <a:buNone/>
+              <a:defRPr sz="1600">
                 <a:solidFill>
                   <a:schemeClr val="tx1">
                     <a:tint val="75000"/>
@@ -930,9 +931,9 @@
                 </a:solidFill>
               </a:defRPr>
             </a:lvl4pPr>
-            <a:lvl5pPr marL="1371600" indent="0">
-              <a:buNone/>
-              <a:defRPr sz="1200">
+            <a:lvl5pPr marL="1828800" indent="0">
+              <a:buNone/>
+              <a:defRPr sz="1600">
                 <a:solidFill>
                   <a:schemeClr val="tx1">
                     <a:tint val="75000"/>
@@ -940,9 +941,9 @@
                 </a:solidFill>
               </a:defRPr>
             </a:lvl5pPr>
-            <a:lvl6pPr marL="1714500" indent="0">
-              <a:buNone/>
-              <a:defRPr sz="1200">
+            <a:lvl6pPr marL="2286000" indent="0">
+              <a:buNone/>
+              <a:defRPr sz="1600">
                 <a:solidFill>
                   <a:schemeClr val="tx1">
                     <a:tint val="75000"/>
@@ -950,9 +951,9 @@
                 </a:solidFill>
               </a:defRPr>
             </a:lvl6pPr>
-            <a:lvl7pPr marL="2057400" indent="0">
-              <a:buNone/>
-              <a:defRPr sz="1200">
+            <a:lvl7pPr marL="2743200" indent="0">
+              <a:buNone/>
+              <a:defRPr sz="1600">
                 <a:solidFill>
                   <a:schemeClr val="tx1">
                     <a:tint val="75000"/>
@@ -960,9 +961,9 @@
                 </a:solidFill>
               </a:defRPr>
             </a:lvl7pPr>
-            <a:lvl8pPr marL="2400300" indent="0">
-              <a:buNone/>
-              <a:defRPr sz="1200">
+            <a:lvl8pPr marL="3200400" indent="0">
+              <a:buNone/>
+              <a:defRPr sz="1600">
                 <a:solidFill>
                   <a:schemeClr val="tx1">
                     <a:tint val="75000"/>
@@ -970,9 +971,9 @@
                 </a:solidFill>
               </a:defRPr>
             </a:lvl8pPr>
-            <a:lvl9pPr marL="2743200" indent="0">
-              <a:buNone/>
-              <a:defRPr sz="1200">
+            <a:lvl9pPr marL="3657600" indent="0">
+              <a:buNone/>
+              <a:defRPr sz="1600">
                 <a:solidFill>
                   <a:schemeClr val="tx1">
                     <a:tint val="75000"/>
@@ -1007,7 +1008,7 @@
           <a:p>
             <a:fld id="{75529F3F-3E84-487A-AFD3-E6472C0E63DF}" type="datetimeFigureOut">
               <a:rPr lang="en-US" smtClean="0"/>
-              <a:t>10/21/2019</a:t>
+              <a:t>10/28/2019</a:t>
             </a:fld>
             <a:endParaRPr lang="en-US"/>
           </a:p>
@@ -1058,7 +1059,7 @@
     </p:spTree>
     <p:extLst>
       <p:ext uri="{BB962C8B-B14F-4D97-AF65-F5344CB8AC3E}">
-        <p14:creationId xmlns:p14="http://schemas.microsoft.com/office/powerpoint/2010/main" val="2563111832"/>
+        <p14:creationId xmlns:p14="http://schemas.microsoft.com/office/powerpoint/2010/main" val="1491573338"/>
       </p:ext>
     </p:extLst>
   </p:cSld>
@@ -1120,8 +1121,8 @@
         </p:nvSpPr>
         <p:spPr>
           <a:xfrm>
-            <a:off x="471488" y="3245556"/>
-            <a:ext cx="2914650" cy="7735712"/>
+            <a:off x="628650" y="1825625"/>
+            <a:ext cx="3886200" cy="4351338"/>
           </a:xfrm>
         </p:spPr>
         <p:txBody>
@@ -1177,8 +1178,8 @@
         </p:nvSpPr>
         <p:spPr>
           <a:xfrm>
-            <a:off x="3471863" y="3245556"/>
-            <a:ext cx="2914650" cy="7735712"/>
+            <a:off x="4629150" y="1825625"/>
+            <a:ext cx="3886200" cy="4351338"/>
           </a:xfrm>
         </p:spPr>
         <p:txBody>
@@ -1239,7 +1240,7 @@
           <a:p>
             <a:fld id="{75529F3F-3E84-487A-AFD3-E6472C0E63DF}" type="datetimeFigureOut">
               <a:rPr lang="en-US" smtClean="0"/>
-              <a:t>10/21/2019</a:t>
+              <a:t>10/28/2019</a:t>
             </a:fld>
             <a:endParaRPr lang="en-US"/>
           </a:p>
@@ -1290,7 +1291,7 @@
     </p:spTree>
     <p:extLst>
       <p:ext uri="{BB962C8B-B14F-4D97-AF65-F5344CB8AC3E}">
-        <p14:creationId xmlns:p14="http://schemas.microsoft.com/office/powerpoint/2010/main" val="2827000304"/>
+        <p14:creationId xmlns:p14="http://schemas.microsoft.com/office/powerpoint/2010/main" val="2129825861"/>
       </p:ext>
     </p:extLst>
   </p:cSld>
@@ -1329,8 +1330,8 @@
         </p:nvSpPr>
         <p:spPr>
           <a:xfrm>
-            <a:off x="472381" y="649114"/>
-            <a:ext cx="5915025" cy="2356556"/>
+            <a:off x="629841" y="365126"/>
+            <a:ext cx="7886700" cy="1325563"/>
           </a:xfrm>
         </p:spPr>
         <p:txBody>
@@ -1357,8 +1358,8 @@
         </p:nvSpPr>
         <p:spPr>
           <a:xfrm>
-            <a:off x="472381" y="2988734"/>
-            <a:ext cx="2901255" cy="1464732"/>
+            <a:off x="629842" y="1681163"/>
+            <a:ext cx="3868340" cy="823912"/>
           </a:xfrm>
         </p:spPr>
         <p:txBody>
@@ -1366,39 +1367,39 @@
           <a:lstStyle>
             <a:lvl1pPr marL="0" indent="0">
               <a:buNone/>
+              <a:defRPr sz="2400" b="1"/>
+            </a:lvl1pPr>
+            <a:lvl2pPr marL="457200" indent="0">
+              <a:buNone/>
+              <a:defRPr sz="2000" b="1"/>
+            </a:lvl2pPr>
+            <a:lvl3pPr marL="914400" indent="0">
+              <a:buNone/>
               <a:defRPr sz="1800" b="1"/>
-            </a:lvl1pPr>
-            <a:lvl2pPr marL="342900" indent="0">
-              <a:buNone/>
-              <a:defRPr sz="1500" b="1"/>
-            </a:lvl2pPr>
-            <a:lvl3pPr marL="685800" indent="0">
-              <a:buNone/>
-              <a:defRPr sz="1350" b="1"/>
             </a:lvl3pPr>
-            <a:lvl4pPr marL="1028700" indent="0">
-              <a:buNone/>
-              <a:defRPr sz="1200" b="1"/>
+            <a:lvl4pPr marL="1371600" indent="0">
+              <a:buNone/>
+              <a:defRPr sz="1600" b="1"/>
             </a:lvl4pPr>
-            <a:lvl5pPr marL="1371600" indent="0">
-              <a:buNone/>
-              <a:defRPr sz="1200" b="1"/>
+            <a:lvl5pPr marL="1828800" indent="0">
+              <a:buNone/>
+              <a:defRPr sz="1600" b="1"/>
             </a:lvl5pPr>
-            <a:lvl6pPr marL="1714500" indent="0">
-              <a:buNone/>
-              <a:defRPr sz="1200" b="1"/>
+            <a:lvl6pPr marL="2286000" indent="0">
+              <a:buNone/>
+              <a:defRPr sz="1600" b="1"/>
             </a:lvl6pPr>
-            <a:lvl7pPr marL="2057400" indent="0">
-              <a:buNone/>
-              <a:defRPr sz="1200" b="1"/>
+            <a:lvl7pPr marL="2743200" indent="0">
+              <a:buNone/>
+              <a:defRPr sz="1600" b="1"/>
             </a:lvl7pPr>
-            <a:lvl8pPr marL="2400300" indent="0">
-              <a:buNone/>
-              <a:defRPr sz="1200" b="1"/>
+            <a:lvl8pPr marL="3200400" indent="0">
+              <a:buNone/>
+              <a:defRPr sz="1600" b="1"/>
             </a:lvl8pPr>
-            <a:lvl9pPr marL="2743200" indent="0">
-              <a:buNone/>
-              <a:defRPr sz="1200" b="1"/>
+            <a:lvl9pPr marL="3657600" indent="0">
+              <a:buNone/>
+              <a:defRPr sz="1600" b="1"/>
             </a:lvl9pPr>
           </a:lstStyle>
           <a:p>
@@ -1422,8 +1423,8 @@
         </p:nvSpPr>
         <p:spPr>
           <a:xfrm>
-            <a:off x="472381" y="4453467"/>
-            <a:ext cx="2901255" cy="6550379"/>
+            <a:off x="629842" y="2505075"/>
+            <a:ext cx="3868340" cy="3684588"/>
           </a:xfrm>
         </p:spPr>
         <p:txBody>
@@ -1479,8 +1480,8 @@
         </p:nvSpPr>
         <p:spPr>
           <a:xfrm>
-            <a:off x="3471863" y="2988734"/>
-            <a:ext cx="2915543" cy="1464732"/>
+            <a:off x="4629150" y="1681163"/>
+            <a:ext cx="3887391" cy="823912"/>
           </a:xfrm>
         </p:spPr>
         <p:txBody>
@@ -1488,39 +1489,39 @@
           <a:lstStyle>
             <a:lvl1pPr marL="0" indent="0">
               <a:buNone/>
+              <a:defRPr sz="2400" b="1"/>
+            </a:lvl1pPr>
+            <a:lvl2pPr marL="457200" indent="0">
+              <a:buNone/>
+              <a:defRPr sz="2000" b="1"/>
+            </a:lvl2pPr>
+            <a:lvl3pPr marL="914400" indent="0">
+              <a:buNone/>
               <a:defRPr sz="1800" b="1"/>
-            </a:lvl1pPr>
-            <a:lvl2pPr marL="342900" indent="0">
-              <a:buNone/>
-              <a:defRPr sz="1500" b="1"/>
-            </a:lvl2pPr>
-            <a:lvl3pPr marL="685800" indent="0">
-              <a:buNone/>
-              <a:defRPr sz="1350" b="1"/>
             </a:lvl3pPr>
-            <a:lvl4pPr marL="1028700" indent="0">
-              <a:buNone/>
-              <a:defRPr sz="1200" b="1"/>
+            <a:lvl4pPr marL="1371600" indent="0">
+              <a:buNone/>
+              <a:defRPr sz="1600" b="1"/>
             </a:lvl4pPr>
-            <a:lvl5pPr marL="1371600" indent="0">
-              <a:buNone/>
-              <a:defRPr sz="1200" b="1"/>
+            <a:lvl5pPr marL="1828800" indent="0">
+              <a:buNone/>
+              <a:defRPr sz="1600" b="1"/>
             </a:lvl5pPr>
-            <a:lvl6pPr marL="1714500" indent="0">
-              <a:buNone/>
-              <a:defRPr sz="1200" b="1"/>
+            <a:lvl6pPr marL="2286000" indent="0">
+              <a:buNone/>
+              <a:defRPr sz="1600" b="1"/>
             </a:lvl6pPr>
-            <a:lvl7pPr marL="2057400" indent="0">
-              <a:buNone/>
-              <a:defRPr sz="1200" b="1"/>
+            <a:lvl7pPr marL="2743200" indent="0">
+              <a:buNone/>
+              <a:defRPr sz="1600" b="1"/>
             </a:lvl7pPr>
-            <a:lvl8pPr marL="2400300" indent="0">
-              <a:buNone/>
-              <a:defRPr sz="1200" b="1"/>
+            <a:lvl8pPr marL="3200400" indent="0">
+              <a:buNone/>
+              <a:defRPr sz="1600" b="1"/>
             </a:lvl8pPr>
-            <a:lvl9pPr marL="2743200" indent="0">
-              <a:buNone/>
-              <a:defRPr sz="1200" b="1"/>
+            <a:lvl9pPr marL="3657600" indent="0">
+              <a:buNone/>
+              <a:defRPr sz="1600" b="1"/>
             </a:lvl9pPr>
           </a:lstStyle>
           <a:p>
@@ -1544,8 +1545,8 @@
         </p:nvSpPr>
         <p:spPr>
           <a:xfrm>
-            <a:off x="3471863" y="4453467"/>
-            <a:ext cx="2915543" cy="6550379"/>
+            <a:off x="4629150" y="2505075"/>
+            <a:ext cx="3887391" cy="3684588"/>
           </a:xfrm>
         </p:spPr>
         <p:txBody>
@@ -1606,7 +1607,7 @@
           <a:p>
             <a:fld id="{75529F3F-3E84-487A-AFD3-E6472C0E63DF}" type="datetimeFigureOut">
               <a:rPr lang="en-US" smtClean="0"/>
-              <a:t>10/21/2019</a:t>
+              <a:t>10/28/2019</a:t>
             </a:fld>
             <a:endParaRPr lang="en-US"/>
           </a:p>
@@ -1657,7 +1658,7 @@
     </p:spTree>
     <p:extLst>
       <p:ext uri="{BB962C8B-B14F-4D97-AF65-F5344CB8AC3E}">
-        <p14:creationId xmlns:p14="http://schemas.microsoft.com/office/powerpoint/2010/main" val="3418015276"/>
+        <p14:creationId xmlns:p14="http://schemas.microsoft.com/office/powerpoint/2010/main" val="3926491388"/>
       </p:ext>
     </p:extLst>
   </p:cSld>
@@ -1724,7 +1725,7 @@
           <a:p>
             <a:fld id="{75529F3F-3E84-487A-AFD3-E6472C0E63DF}" type="datetimeFigureOut">
               <a:rPr lang="en-US" smtClean="0"/>
-              <a:t>10/21/2019</a:t>
+              <a:t>10/28/2019</a:t>
             </a:fld>
             <a:endParaRPr lang="en-US"/>
           </a:p>
@@ -1775,7 +1776,7 @@
     </p:spTree>
     <p:extLst>
       <p:ext uri="{BB962C8B-B14F-4D97-AF65-F5344CB8AC3E}">
-        <p14:creationId xmlns:p14="http://schemas.microsoft.com/office/powerpoint/2010/main" val="4164135080"/>
+        <p14:creationId xmlns:p14="http://schemas.microsoft.com/office/powerpoint/2010/main" val="3868583729"/>
       </p:ext>
     </p:extLst>
   </p:cSld>
@@ -1819,7 +1820,7 @@
           <a:p>
             <a:fld id="{75529F3F-3E84-487A-AFD3-E6472C0E63DF}" type="datetimeFigureOut">
               <a:rPr lang="en-US" smtClean="0"/>
-              <a:t>10/21/2019</a:t>
+              <a:t>10/28/2019</a:t>
             </a:fld>
             <a:endParaRPr lang="en-US"/>
           </a:p>
@@ -1870,7 +1871,7 @@
     </p:spTree>
     <p:extLst>
       <p:ext uri="{BB962C8B-B14F-4D97-AF65-F5344CB8AC3E}">
-        <p14:creationId xmlns:p14="http://schemas.microsoft.com/office/powerpoint/2010/main" val="1250204106"/>
+        <p14:creationId xmlns:p14="http://schemas.microsoft.com/office/powerpoint/2010/main" val="3284929643"/>
       </p:ext>
     </p:extLst>
   </p:cSld>
@@ -1909,15 +1910,15 @@
         </p:nvSpPr>
         <p:spPr>
           <a:xfrm>
-            <a:off x="472381" y="812800"/>
-            <a:ext cx="2211884" cy="2844800"/>
+            <a:off x="629841" y="457200"/>
+            <a:ext cx="2949178" cy="1600200"/>
           </a:xfrm>
         </p:spPr>
         <p:txBody>
           <a:bodyPr anchor="b"/>
           <a:lstStyle>
             <a:lvl1pPr>
-              <a:defRPr sz="2400"/>
+              <a:defRPr sz="3200"/>
             </a:lvl1pPr>
           </a:lstStyle>
           <a:p>
@@ -1941,39 +1942,39 @@
         </p:nvSpPr>
         <p:spPr>
           <a:xfrm>
-            <a:off x="2915543" y="1755425"/>
-            <a:ext cx="3471863" cy="8664222"/>
+            <a:off x="3887391" y="987426"/>
+            <a:ext cx="4629150" cy="4873625"/>
           </a:xfrm>
         </p:spPr>
         <p:txBody>
           <a:bodyPr/>
           <a:lstStyle>
             <a:lvl1pPr>
-              <a:defRPr sz="2400"/>
+              <a:defRPr sz="3200"/>
             </a:lvl1pPr>
             <a:lvl2pPr>
-              <a:defRPr sz="2100"/>
+              <a:defRPr sz="2800"/>
             </a:lvl2pPr>
             <a:lvl3pPr>
-              <a:defRPr sz="1800"/>
+              <a:defRPr sz="2400"/>
             </a:lvl3pPr>
             <a:lvl4pPr>
-              <a:defRPr sz="1500"/>
+              <a:defRPr sz="2000"/>
             </a:lvl4pPr>
             <a:lvl5pPr>
-              <a:defRPr sz="1500"/>
+              <a:defRPr sz="2000"/>
             </a:lvl5pPr>
             <a:lvl6pPr>
-              <a:defRPr sz="1500"/>
+              <a:defRPr sz="2000"/>
             </a:lvl6pPr>
             <a:lvl7pPr>
-              <a:defRPr sz="1500"/>
+              <a:defRPr sz="2000"/>
             </a:lvl7pPr>
             <a:lvl8pPr>
-              <a:defRPr sz="1500"/>
+              <a:defRPr sz="2000"/>
             </a:lvl8pPr>
             <a:lvl9pPr>
-              <a:defRPr sz="1500"/>
+              <a:defRPr sz="2000"/>
             </a:lvl9pPr>
           </a:lstStyle>
           <a:p>
@@ -2026,8 +2027,8 @@
         </p:nvSpPr>
         <p:spPr>
           <a:xfrm>
-            <a:off x="472381" y="3657600"/>
-            <a:ext cx="2211884" cy="6776156"/>
+            <a:off x="629841" y="2057400"/>
+            <a:ext cx="2949178" cy="3811588"/>
           </a:xfrm>
         </p:spPr>
         <p:txBody>
@@ -2035,39 +2036,39 @@
           <a:lstStyle>
             <a:lvl1pPr marL="0" indent="0">
               <a:buNone/>
+              <a:defRPr sz="1600"/>
+            </a:lvl1pPr>
+            <a:lvl2pPr marL="457200" indent="0">
+              <a:buNone/>
+              <a:defRPr sz="1400"/>
+            </a:lvl2pPr>
+            <a:lvl3pPr marL="914400" indent="0">
+              <a:buNone/>
               <a:defRPr sz="1200"/>
-            </a:lvl1pPr>
-            <a:lvl2pPr marL="342900" indent="0">
-              <a:buNone/>
-              <a:defRPr sz="1050"/>
-            </a:lvl2pPr>
-            <a:lvl3pPr marL="685800" indent="0">
-              <a:buNone/>
-              <a:defRPr sz="900"/>
             </a:lvl3pPr>
-            <a:lvl4pPr marL="1028700" indent="0">
-              <a:buNone/>
-              <a:defRPr sz="750"/>
+            <a:lvl4pPr marL="1371600" indent="0">
+              <a:buNone/>
+              <a:defRPr sz="1000"/>
             </a:lvl4pPr>
-            <a:lvl5pPr marL="1371600" indent="0">
-              <a:buNone/>
-              <a:defRPr sz="750"/>
+            <a:lvl5pPr marL="1828800" indent="0">
+              <a:buNone/>
+              <a:defRPr sz="1000"/>
             </a:lvl5pPr>
-            <a:lvl6pPr marL="1714500" indent="0">
-              <a:buNone/>
-              <a:defRPr sz="750"/>
+            <a:lvl6pPr marL="2286000" indent="0">
+              <a:buNone/>
+              <a:defRPr sz="1000"/>
             </a:lvl6pPr>
-            <a:lvl7pPr marL="2057400" indent="0">
-              <a:buNone/>
-              <a:defRPr sz="750"/>
+            <a:lvl7pPr marL="2743200" indent="0">
+              <a:buNone/>
+              <a:defRPr sz="1000"/>
             </a:lvl7pPr>
-            <a:lvl8pPr marL="2400300" indent="0">
-              <a:buNone/>
-              <a:defRPr sz="750"/>
+            <a:lvl8pPr marL="3200400" indent="0">
+              <a:buNone/>
+              <a:defRPr sz="1000"/>
             </a:lvl8pPr>
-            <a:lvl9pPr marL="2743200" indent="0">
-              <a:buNone/>
-              <a:defRPr sz="750"/>
+            <a:lvl9pPr marL="3657600" indent="0">
+              <a:buNone/>
+              <a:defRPr sz="1000"/>
             </a:lvl9pPr>
           </a:lstStyle>
           <a:p>
@@ -2096,7 +2097,7 @@
           <a:p>
             <a:fld id="{75529F3F-3E84-487A-AFD3-E6472C0E63DF}" type="datetimeFigureOut">
               <a:rPr lang="en-US" smtClean="0"/>
-              <a:t>10/21/2019</a:t>
+              <a:t>10/28/2019</a:t>
             </a:fld>
             <a:endParaRPr lang="en-US"/>
           </a:p>
@@ -2147,7 +2148,7 @@
     </p:spTree>
     <p:extLst>
       <p:ext uri="{BB962C8B-B14F-4D97-AF65-F5344CB8AC3E}">
-        <p14:creationId xmlns:p14="http://schemas.microsoft.com/office/powerpoint/2010/main" val="4056182694"/>
+        <p14:creationId xmlns:p14="http://schemas.microsoft.com/office/powerpoint/2010/main" val="4075746450"/>
       </p:ext>
     </p:extLst>
   </p:cSld>
@@ -2186,15 +2187,15 @@
         </p:nvSpPr>
         <p:spPr>
           <a:xfrm>
-            <a:off x="472381" y="812800"/>
-            <a:ext cx="2211884" cy="2844800"/>
+            <a:off x="629841" y="457200"/>
+            <a:ext cx="2949178" cy="1600200"/>
           </a:xfrm>
         </p:spPr>
         <p:txBody>
           <a:bodyPr anchor="b"/>
           <a:lstStyle>
             <a:lvl1pPr>
-              <a:defRPr sz="2400"/>
+              <a:defRPr sz="3200"/>
             </a:lvl1pPr>
           </a:lstStyle>
           <a:p>
@@ -2218,8 +2219,8 @@
         </p:nvSpPr>
         <p:spPr>
           <a:xfrm>
-            <a:off x="2915543" y="1755425"/>
-            <a:ext cx="3471863" cy="8664222"/>
+            <a:off x="3887391" y="987426"/>
+            <a:ext cx="4629150" cy="4873625"/>
           </a:xfrm>
         </p:spPr>
         <p:txBody>
@@ -2227,39 +2228,39 @@
           <a:lstStyle>
             <a:lvl1pPr marL="0" indent="0">
               <a:buNone/>
+              <a:defRPr sz="3200"/>
+            </a:lvl1pPr>
+            <a:lvl2pPr marL="457200" indent="0">
+              <a:buNone/>
+              <a:defRPr sz="2800"/>
+            </a:lvl2pPr>
+            <a:lvl3pPr marL="914400" indent="0">
+              <a:buNone/>
               <a:defRPr sz="2400"/>
-            </a:lvl1pPr>
-            <a:lvl2pPr marL="342900" indent="0">
-              <a:buNone/>
-              <a:defRPr sz="2100"/>
-            </a:lvl2pPr>
-            <a:lvl3pPr marL="685800" indent="0">
-              <a:buNone/>
-              <a:defRPr sz="1800"/>
             </a:lvl3pPr>
-            <a:lvl4pPr marL="1028700" indent="0">
-              <a:buNone/>
-              <a:defRPr sz="1500"/>
+            <a:lvl4pPr marL="1371600" indent="0">
+              <a:buNone/>
+              <a:defRPr sz="2000"/>
             </a:lvl4pPr>
-            <a:lvl5pPr marL="1371600" indent="0">
-              <a:buNone/>
-              <a:defRPr sz="1500"/>
+            <a:lvl5pPr marL="1828800" indent="0">
+              <a:buNone/>
+              <a:defRPr sz="2000"/>
             </a:lvl5pPr>
-            <a:lvl6pPr marL="1714500" indent="0">
-              <a:buNone/>
-              <a:defRPr sz="1500"/>
+            <a:lvl6pPr marL="2286000" indent="0">
+              <a:buNone/>
+              <a:defRPr sz="2000"/>
             </a:lvl6pPr>
-            <a:lvl7pPr marL="2057400" indent="0">
-              <a:buNone/>
-              <a:defRPr sz="1500"/>
+            <a:lvl7pPr marL="2743200" indent="0">
+              <a:buNone/>
+              <a:defRPr sz="2000"/>
             </a:lvl7pPr>
-            <a:lvl8pPr marL="2400300" indent="0">
-              <a:buNone/>
-              <a:defRPr sz="1500"/>
+            <a:lvl8pPr marL="3200400" indent="0">
+              <a:buNone/>
+              <a:defRPr sz="2000"/>
             </a:lvl8pPr>
-            <a:lvl9pPr marL="2743200" indent="0">
-              <a:buNone/>
-              <a:defRPr sz="1500"/>
+            <a:lvl9pPr marL="3657600" indent="0">
+              <a:buNone/>
+              <a:defRPr sz="2000"/>
             </a:lvl9pPr>
           </a:lstStyle>
           <a:p>
@@ -2283,8 +2284,8 @@
         </p:nvSpPr>
         <p:spPr>
           <a:xfrm>
-            <a:off x="472381" y="3657600"/>
-            <a:ext cx="2211884" cy="6776156"/>
+            <a:off x="629841" y="2057400"/>
+            <a:ext cx="2949178" cy="3811588"/>
           </a:xfrm>
         </p:spPr>
         <p:txBody>
@@ -2292,39 +2293,39 @@
           <a:lstStyle>
             <a:lvl1pPr marL="0" indent="0">
               <a:buNone/>
+              <a:defRPr sz="1600"/>
+            </a:lvl1pPr>
+            <a:lvl2pPr marL="457200" indent="0">
+              <a:buNone/>
+              <a:defRPr sz="1400"/>
+            </a:lvl2pPr>
+            <a:lvl3pPr marL="914400" indent="0">
+              <a:buNone/>
               <a:defRPr sz="1200"/>
-            </a:lvl1pPr>
-            <a:lvl2pPr marL="342900" indent="0">
-              <a:buNone/>
-              <a:defRPr sz="1050"/>
-            </a:lvl2pPr>
-            <a:lvl3pPr marL="685800" indent="0">
-              <a:buNone/>
-              <a:defRPr sz="900"/>
             </a:lvl3pPr>
-            <a:lvl4pPr marL="1028700" indent="0">
-              <a:buNone/>
-              <a:defRPr sz="750"/>
+            <a:lvl4pPr marL="1371600" indent="0">
+              <a:buNone/>
+              <a:defRPr sz="1000"/>
             </a:lvl4pPr>
-            <a:lvl5pPr marL="1371600" indent="0">
-              <a:buNone/>
-              <a:defRPr sz="750"/>
+            <a:lvl5pPr marL="1828800" indent="0">
+              <a:buNone/>
+              <a:defRPr sz="1000"/>
             </a:lvl5pPr>
-            <a:lvl6pPr marL="1714500" indent="0">
-              <a:buNone/>
-              <a:defRPr sz="750"/>
+            <a:lvl6pPr marL="2286000" indent="0">
+              <a:buNone/>
+              <a:defRPr sz="1000"/>
             </a:lvl6pPr>
-            <a:lvl7pPr marL="2057400" indent="0">
-              <a:buNone/>
-              <a:defRPr sz="750"/>
+            <a:lvl7pPr marL="2743200" indent="0">
+              <a:buNone/>
+              <a:defRPr sz="1000"/>
             </a:lvl7pPr>
-            <a:lvl8pPr marL="2400300" indent="0">
-              <a:buNone/>
-              <a:defRPr sz="750"/>
+            <a:lvl8pPr marL="3200400" indent="0">
+              <a:buNone/>
+              <a:defRPr sz="1000"/>
             </a:lvl8pPr>
-            <a:lvl9pPr marL="2743200" indent="0">
-              <a:buNone/>
-              <a:defRPr sz="750"/>
+            <a:lvl9pPr marL="3657600" indent="0">
+              <a:buNone/>
+              <a:defRPr sz="1000"/>
             </a:lvl9pPr>
           </a:lstStyle>
           <a:p>
@@ -2353,7 +2354,7 @@
           <a:p>
             <a:fld id="{75529F3F-3E84-487A-AFD3-E6472C0E63DF}" type="datetimeFigureOut">
               <a:rPr lang="en-US" smtClean="0"/>
-              <a:t>10/21/2019</a:t>
+              <a:t>10/28/2019</a:t>
             </a:fld>
             <a:endParaRPr lang="en-US"/>
           </a:p>
@@ -2404,7 +2405,7 @@
     </p:spTree>
     <p:extLst>
       <p:ext uri="{BB962C8B-B14F-4D97-AF65-F5344CB8AC3E}">
-        <p14:creationId xmlns:p14="http://schemas.microsoft.com/office/powerpoint/2010/main" val="2861893250"/>
+        <p14:creationId xmlns:p14="http://schemas.microsoft.com/office/powerpoint/2010/main" val="665528682"/>
       </p:ext>
     </p:extLst>
   </p:cSld>
@@ -2448,8 +2449,8 @@
         </p:nvSpPr>
         <p:spPr>
           <a:xfrm>
-            <a:off x="471488" y="649114"/>
-            <a:ext cx="5915025" cy="2356556"/>
+            <a:off x="628650" y="365126"/>
+            <a:ext cx="7886700" cy="1325563"/>
           </a:xfrm>
           <a:prstGeom prst="rect">
             <a:avLst/>
@@ -2481,8 +2482,8 @@
         </p:nvSpPr>
         <p:spPr>
           <a:xfrm>
-            <a:off x="471488" y="3245556"/>
-            <a:ext cx="5915025" cy="7735712"/>
+            <a:off x="628650" y="1825625"/>
+            <a:ext cx="7886700" cy="4351338"/>
           </a:xfrm>
           <a:prstGeom prst="rect">
             <a:avLst/>
@@ -2543,8 +2544,8 @@
         </p:nvSpPr>
         <p:spPr>
           <a:xfrm>
-            <a:off x="471488" y="11300181"/>
-            <a:ext cx="1543050" cy="649111"/>
+            <a:off x="628650" y="6356351"/>
+            <a:ext cx="2057400" cy="365125"/>
           </a:xfrm>
           <a:prstGeom prst="rect">
             <a:avLst/>
@@ -2554,7 +2555,7 @@
           <a:bodyPr vert="horz" lIns="91440" tIns="45720" rIns="91440" bIns="45720" rtlCol="0" anchor="ctr"/>
           <a:lstStyle>
             <a:lvl1pPr algn="l">
-              <a:defRPr sz="900">
+              <a:defRPr sz="1200">
                 <a:solidFill>
                   <a:schemeClr val="tx1">
                     <a:tint val="75000"/>
@@ -2566,7 +2567,7 @@
           <a:p>
             <a:fld id="{75529F3F-3E84-487A-AFD3-E6472C0E63DF}" type="datetimeFigureOut">
               <a:rPr lang="en-US" smtClean="0"/>
-              <a:t>10/21/2019</a:t>
+              <a:t>10/28/2019</a:t>
             </a:fld>
             <a:endParaRPr lang="en-US"/>
           </a:p>
@@ -2584,8 +2585,8 @@
         </p:nvSpPr>
         <p:spPr>
           <a:xfrm>
-            <a:off x="2271713" y="11300181"/>
-            <a:ext cx="2314575" cy="649111"/>
+            <a:off x="3028950" y="6356351"/>
+            <a:ext cx="3086100" cy="365125"/>
           </a:xfrm>
           <a:prstGeom prst="rect">
             <a:avLst/>
@@ -2595,7 +2596,7 @@
           <a:bodyPr vert="horz" lIns="91440" tIns="45720" rIns="91440" bIns="45720" rtlCol="0" anchor="ctr"/>
           <a:lstStyle>
             <a:lvl1pPr algn="ctr">
-              <a:defRPr sz="900">
+              <a:defRPr sz="1200">
                 <a:solidFill>
                   <a:schemeClr val="tx1">
                     <a:tint val="75000"/>
@@ -2621,8 +2622,8 @@
         </p:nvSpPr>
         <p:spPr>
           <a:xfrm>
-            <a:off x="4843463" y="11300181"/>
-            <a:ext cx="1543050" cy="649111"/>
+            <a:off x="6457950" y="6356351"/>
+            <a:ext cx="2057400" cy="365125"/>
           </a:xfrm>
           <a:prstGeom prst="rect">
             <a:avLst/>
@@ -2632,7 +2633,7 @@
           <a:bodyPr vert="horz" lIns="91440" tIns="45720" rIns="91440" bIns="45720" rtlCol="0" anchor="ctr"/>
           <a:lstStyle>
             <a:lvl1pPr algn="r">
-              <a:defRPr sz="900">
+              <a:defRPr sz="1200">
                 <a:solidFill>
                   <a:schemeClr val="tx1">
                     <a:tint val="75000"/>
@@ -2653,27 +2654,27 @@
     </p:spTree>
     <p:extLst>
       <p:ext uri="{BB962C8B-B14F-4D97-AF65-F5344CB8AC3E}">
-        <p14:creationId xmlns:p14="http://schemas.microsoft.com/office/powerpoint/2010/main" val="766090038"/>
+        <p14:creationId xmlns:p14="http://schemas.microsoft.com/office/powerpoint/2010/main" val="529561456"/>
       </p:ext>
     </p:extLst>
   </p:cSld>
   <p:clrMap bg1="lt1" tx1="dk1" bg2="lt2" tx2="dk2" accent1="accent1" accent2="accent2" accent3="accent3" accent4="accent4" accent5="accent5" accent6="accent6" hlink="hlink" folHlink="folHlink"/>
   <p:sldLayoutIdLst>
-    <p:sldLayoutId id="2147483661" r:id="rId1"/>
-    <p:sldLayoutId id="2147483662" r:id="rId2"/>
-    <p:sldLayoutId id="2147483663" r:id="rId3"/>
-    <p:sldLayoutId id="2147483664" r:id="rId4"/>
-    <p:sldLayoutId id="2147483665" r:id="rId5"/>
-    <p:sldLayoutId id="2147483666" r:id="rId6"/>
-    <p:sldLayoutId id="2147483667" r:id="rId7"/>
-    <p:sldLayoutId id="2147483668" r:id="rId8"/>
-    <p:sldLayoutId id="2147483669" r:id="rId9"/>
-    <p:sldLayoutId id="2147483670" r:id="rId10"/>
-    <p:sldLayoutId id="2147483671" r:id="rId11"/>
+    <p:sldLayoutId id="2147483673" r:id="rId1"/>
+    <p:sldLayoutId id="2147483674" r:id="rId2"/>
+    <p:sldLayoutId id="2147483675" r:id="rId3"/>
+    <p:sldLayoutId id="2147483676" r:id="rId4"/>
+    <p:sldLayoutId id="2147483677" r:id="rId5"/>
+    <p:sldLayoutId id="2147483678" r:id="rId6"/>
+    <p:sldLayoutId id="2147483679" r:id="rId7"/>
+    <p:sldLayoutId id="2147483680" r:id="rId8"/>
+    <p:sldLayoutId id="2147483681" r:id="rId9"/>
+    <p:sldLayoutId id="2147483682" r:id="rId10"/>
+    <p:sldLayoutId id="2147483683" r:id="rId11"/>
   </p:sldLayoutIdLst>
   <p:txStyles>
     <p:titleStyle>
-      <a:lvl1pPr algn="l" defTabSz="685800" rtl="0" eaLnBrk="1" latinLnBrk="0" hangingPunct="1">
+      <a:lvl1pPr algn="l" defTabSz="914400" rtl="0" eaLnBrk="1" latinLnBrk="0" hangingPunct="1">
         <a:lnSpc>
           <a:spcPct val="90000"/>
         </a:lnSpc>
@@ -2681,7 +2682,7 @@
           <a:spcPct val="0"/>
         </a:spcBef>
         <a:buNone/>
-        <a:defRPr sz="3300" kern="1200">
+        <a:defRPr sz="4400" kern="1200">
           <a:solidFill>
             <a:schemeClr val="tx1"/>
           </a:solidFill>
@@ -2692,16 +2693,16 @@
       </a:lvl1pPr>
     </p:titleStyle>
     <p:bodyStyle>
-      <a:lvl1pPr marL="171450" indent="-171450" algn="l" defTabSz="685800" rtl="0" eaLnBrk="1" latinLnBrk="0" hangingPunct="1">
+      <a:lvl1pPr marL="228600" indent="-228600" algn="l" defTabSz="914400" rtl="0" eaLnBrk="1" latinLnBrk="0" hangingPunct="1">
         <a:lnSpc>
           <a:spcPct val="90000"/>
         </a:lnSpc>
         <a:spcBef>
-          <a:spcPts val="750"/>
+          <a:spcPts val="1000"/>
         </a:spcBef>
         <a:buFont typeface="Arial" panose="020B0604020202020204" pitchFamily="34" charset="0"/>
         <a:buChar char="•"/>
-        <a:defRPr sz="2100" kern="1200">
+        <a:defRPr sz="2800" kern="1200">
           <a:solidFill>
             <a:schemeClr val="tx1"/>
           </a:solidFill>
@@ -2710,12 +2711,48 @@
           <a:cs typeface="+mn-cs"/>
         </a:defRPr>
       </a:lvl1pPr>
-      <a:lvl2pPr marL="514350" indent="-171450" algn="l" defTabSz="685800" rtl="0" eaLnBrk="1" latinLnBrk="0" hangingPunct="1">
+      <a:lvl2pPr marL="685800" indent="-228600" algn="l" defTabSz="914400" rtl="0" eaLnBrk="1" latinLnBrk="0" hangingPunct="1">
         <a:lnSpc>
           <a:spcPct val="90000"/>
         </a:lnSpc>
         <a:spcBef>
-          <a:spcPts val="375"/>
+          <a:spcPts val="500"/>
+        </a:spcBef>
+        <a:buFont typeface="Arial" panose="020B0604020202020204" pitchFamily="34" charset="0"/>
+        <a:buChar char="•"/>
+        <a:defRPr sz="2400" kern="1200">
+          <a:solidFill>
+            <a:schemeClr val="tx1"/>
+          </a:solidFill>
+          <a:latin typeface="+mn-lt"/>
+          <a:ea typeface="+mn-ea"/>
+          <a:cs typeface="+mn-cs"/>
+        </a:defRPr>
+      </a:lvl2pPr>
+      <a:lvl3pPr marL="1143000" indent="-228600" algn="l" defTabSz="914400" rtl="0" eaLnBrk="1" latinLnBrk="0" hangingPunct="1">
+        <a:lnSpc>
+          <a:spcPct val="90000"/>
+        </a:lnSpc>
+        <a:spcBef>
+          <a:spcPts val="500"/>
+        </a:spcBef>
+        <a:buFont typeface="Arial" panose="020B0604020202020204" pitchFamily="34" charset="0"/>
+        <a:buChar char="•"/>
+        <a:defRPr sz="2000" kern="1200">
+          <a:solidFill>
+            <a:schemeClr val="tx1"/>
+          </a:solidFill>
+          <a:latin typeface="+mn-lt"/>
+          <a:ea typeface="+mn-ea"/>
+          <a:cs typeface="+mn-cs"/>
+        </a:defRPr>
+      </a:lvl3pPr>
+      <a:lvl4pPr marL="1600200" indent="-228600" algn="l" defTabSz="914400" rtl="0" eaLnBrk="1" latinLnBrk="0" hangingPunct="1">
+        <a:lnSpc>
+          <a:spcPct val="90000"/>
+        </a:lnSpc>
+        <a:spcBef>
+          <a:spcPts val="500"/>
         </a:spcBef>
         <a:buFont typeface="Arial" panose="020B0604020202020204" pitchFamily="34" charset="0"/>
         <a:buChar char="•"/>
@@ -2727,53 +2764,17 @@
           <a:ea typeface="+mn-ea"/>
           <a:cs typeface="+mn-cs"/>
         </a:defRPr>
-      </a:lvl2pPr>
-      <a:lvl3pPr marL="857250" indent="-171450" algn="l" defTabSz="685800" rtl="0" eaLnBrk="1" latinLnBrk="0" hangingPunct="1">
+      </a:lvl4pPr>
+      <a:lvl5pPr marL="2057400" indent="-228600" algn="l" defTabSz="914400" rtl="0" eaLnBrk="1" latinLnBrk="0" hangingPunct="1">
         <a:lnSpc>
           <a:spcPct val="90000"/>
         </a:lnSpc>
         <a:spcBef>
-          <a:spcPts val="375"/>
+          <a:spcPts val="500"/>
         </a:spcBef>
         <a:buFont typeface="Arial" panose="020B0604020202020204" pitchFamily="34" charset="0"/>
         <a:buChar char="•"/>
-        <a:defRPr sz="1500" kern="1200">
-          <a:solidFill>
-            <a:schemeClr val="tx1"/>
-          </a:solidFill>
-          <a:latin typeface="+mn-lt"/>
-          <a:ea typeface="+mn-ea"/>
-          <a:cs typeface="+mn-cs"/>
-        </a:defRPr>
-      </a:lvl3pPr>
-      <a:lvl4pPr marL="1200150" indent="-171450" algn="l" defTabSz="685800" rtl="0" eaLnBrk="1" latinLnBrk="0" hangingPunct="1">
-        <a:lnSpc>
-          <a:spcPct val="90000"/>
-        </a:lnSpc>
-        <a:spcBef>
-          <a:spcPts val="375"/>
-        </a:spcBef>
-        <a:buFont typeface="Arial" panose="020B0604020202020204" pitchFamily="34" charset="0"/>
-        <a:buChar char="•"/>
-        <a:defRPr sz="1350" kern="1200">
-          <a:solidFill>
-            <a:schemeClr val="tx1"/>
-          </a:solidFill>
-          <a:latin typeface="+mn-lt"/>
-          <a:ea typeface="+mn-ea"/>
-          <a:cs typeface="+mn-cs"/>
-        </a:defRPr>
-      </a:lvl4pPr>
-      <a:lvl5pPr marL="1543050" indent="-171450" algn="l" defTabSz="685800" rtl="0" eaLnBrk="1" latinLnBrk="0" hangingPunct="1">
-        <a:lnSpc>
-          <a:spcPct val="90000"/>
-        </a:lnSpc>
-        <a:spcBef>
-          <a:spcPts val="375"/>
-        </a:spcBef>
-        <a:buFont typeface="Arial" panose="020B0604020202020204" pitchFamily="34" charset="0"/>
-        <a:buChar char="•"/>
-        <a:defRPr sz="1350" kern="1200">
+        <a:defRPr sz="1800" kern="1200">
           <a:solidFill>
             <a:schemeClr val="tx1"/>
           </a:solidFill>
@@ -2782,16 +2783,16 @@
           <a:cs typeface="+mn-cs"/>
         </a:defRPr>
       </a:lvl5pPr>
-      <a:lvl6pPr marL="1885950" indent="-171450" algn="l" defTabSz="685800" rtl="0" eaLnBrk="1" latinLnBrk="0" hangingPunct="1">
+      <a:lvl6pPr marL="2514600" indent="-228600" algn="l" defTabSz="914400" rtl="0" eaLnBrk="1" latinLnBrk="0" hangingPunct="1">
         <a:lnSpc>
           <a:spcPct val="90000"/>
         </a:lnSpc>
         <a:spcBef>
-          <a:spcPts val="375"/>
+          <a:spcPts val="500"/>
         </a:spcBef>
         <a:buFont typeface="Arial" panose="020B0604020202020204" pitchFamily="34" charset="0"/>
         <a:buChar char="•"/>
-        <a:defRPr sz="1350" kern="1200">
+        <a:defRPr sz="1800" kern="1200">
           <a:solidFill>
             <a:schemeClr val="tx1"/>
           </a:solidFill>
@@ -2800,16 +2801,16 @@
           <a:cs typeface="+mn-cs"/>
         </a:defRPr>
       </a:lvl6pPr>
-      <a:lvl7pPr marL="2228850" indent="-171450" algn="l" defTabSz="685800" rtl="0" eaLnBrk="1" latinLnBrk="0" hangingPunct="1">
+      <a:lvl7pPr marL="2971800" indent="-228600" algn="l" defTabSz="914400" rtl="0" eaLnBrk="1" latinLnBrk="0" hangingPunct="1">
         <a:lnSpc>
           <a:spcPct val="90000"/>
         </a:lnSpc>
         <a:spcBef>
-          <a:spcPts val="375"/>
+          <a:spcPts val="500"/>
         </a:spcBef>
         <a:buFont typeface="Arial" panose="020B0604020202020204" pitchFamily="34" charset="0"/>
         <a:buChar char="•"/>
-        <a:defRPr sz="1350" kern="1200">
+        <a:defRPr sz="1800" kern="1200">
           <a:solidFill>
             <a:schemeClr val="tx1"/>
           </a:solidFill>
@@ -2818,16 +2819,16 @@
           <a:cs typeface="+mn-cs"/>
         </a:defRPr>
       </a:lvl7pPr>
-      <a:lvl8pPr marL="2571750" indent="-171450" algn="l" defTabSz="685800" rtl="0" eaLnBrk="1" latinLnBrk="0" hangingPunct="1">
+      <a:lvl8pPr marL="3429000" indent="-228600" algn="l" defTabSz="914400" rtl="0" eaLnBrk="1" latinLnBrk="0" hangingPunct="1">
         <a:lnSpc>
           <a:spcPct val="90000"/>
         </a:lnSpc>
         <a:spcBef>
-          <a:spcPts val="375"/>
+          <a:spcPts val="500"/>
         </a:spcBef>
         <a:buFont typeface="Arial" panose="020B0604020202020204" pitchFamily="34" charset="0"/>
         <a:buChar char="•"/>
-        <a:defRPr sz="1350" kern="1200">
+        <a:defRPr sz="1800" kern="1200">
           <a:solidFill>
             <a:schemeClr val="tx1"/>
           </a:solidFill>
@@ -2836,16 +2837,16 @@
           <a:cs typeface="+mn-cs"/>
         </a:defRPr>
       </a:lvl8pPr>
-      <a:lvl9pPr marL="2914650" indent="-171450" algn="l" defTabSz="685800" rtl="0" eaLnBrk="1" latinLnBrk="0" hangingPunct="1">
+      <a:lvl9pPr marL="3886200" indent="-228600" algn="l" defTabSz="914400" rtl="0" eaLnBrk="1" latinLnBrk="0" hangingPunct="1">
         <a:lnSpc>
           <a:spcPct val="90000"/>
         </a:lnSpc>
         <a:spcBef>
-          <a:spcPts val="375"/>
+          <a:spcPts val="500"/>
         </a:spcBef>
         <a:buFont typeface="Arial" panose="020B0604020202020204" pitchFamily="34" charset="0"/>
         <a:buChar char="•"/>
-        <a:defRPr sz="1350" kern="1200">
+        <a:defRPr sz="1800" kern="1200">
           <a:solidFill>
             <a:schemeClr val="tx1"/>
           </a:solidFill>
@@ -2859,8 +2860,8 @@
       <a:defPPr>
         <a:defRPr lang="en-US"/>
       </a:defPPr>
-      <a:lvl1pPr marL="0" algn="l" defTabSz="685800" rtl="0" eaLnBrk="1" latinLnBrk="0" hangingPunct="1">
-        <a:defRPr sz="1350" kern="1200">
+      <a:lvl1pPr marL="0" algn="l" defTabSz="914400" rtl="0" eaLnBrk="1" latinLnBrk="0" hangingPunct="1">
+        <a:defRPr sz="1800" kern="1200">
           <a:solidFill>
             <a:schemeClr val="tx1"/>
           </a:solidFill>
@@ -2869,8 +2870,8 @@
           <a:cs typeface="+mn-cs"/>
         </a:defRPr>
       </a:lvl1pPr>
-      <a:lvl2pPr marL="342900" algn="l" defTabSz="685800" rtl="0" eaLnBrk="1" latinLnBrk="0" hangingPunct="1">
-        <a:defRPr sz="1350" kern="1200">
+      <a:lvl2pPr marL="457200" algn="l" defTabSz="914400" rtl="0" eaLnBrk="1" latinLnBrk="0" hangingPunct="1">
+        <a:defRPr sz="1800" kern="1200">
           <a:solidFill>
             <a:schemeClr val="tx1"/>
           </a:solidFill>
@@ -2879,8 +2880,8 @@
           <a:cs typeface="+mn-cs"/>
         </a:defRPr>
       </a:lvl2pPr>
-      <a:lvl3pPr marL="685800" algn="l" defTabSz="685800" rtl="0" eaLnBrk="1" latinLnBrk="0" hangingPunct="1">
-        <a:defRPr sz="1350" kern="1200">
+      <a:lvl3pPr marL="914400" algn="l" defTabSz="914400" rtl="0" eaLnBrk="1" latinLnBrk="0" hangingPunct="1">
+        <a:defRPr sz="1800" kern="1200">
           <a:solidFill>
             <a:schemeClr val="tx1"/>
           </a:solidFill>
@@ -2889,8 +2890,8 @@
           <a:cs typeface="+mn-cs"/>
         </a:defRPr>
       </a:lvl3pPr>
-      <a:lvl4pPr marL="1028700" algn="l" defTabSz="685800" rtl="0" eaLnBrk="1" latinLnBrk="0" hangingPunct="1">
-        <a:defRPr sz="1350" kern="1200">
+      <a:lvl4pPr marL="1371600" algn="l" defTabSz="914400" rtl="0" eaLnBrk="1" latinLnBrk="0" hangingPunct="1">
+        <a:defRPr sz="1800" kern="1200">
           <a:solidFill>
             <a:schemeClr val="tx1"/>
           </a:solidFill>
@@ -2899,8 +2900,8 @@
           <a:cs typeface="+mn-cs"/>
         </a:defRPr>
       </a:lvl4pPr>
-      <a:lvl5pPr marL="1371600" algn="l" defTabSz="685800" rtl="0" eaLnBrk="1" latinLnBrk="0" hangingPunct="1">
-        <a:defRPr sz="1350" kern="1200">
+      <a:lvl5pPr marL="1828800" algn="l" defTabSz="914400" rtl="0" eaLnBrk="1" latinLnBrk="0" hangingPunct="1">
+        <a:defRPr sz="1800" kern="1200">
           <a:solidFill>
             <a:schemeClr val="tx1"/>
           </a:solidFill>
@@ -2909,8 +2910,8 @@
           <a:cs typeface="+mn-cs"/>
         </a:defRPr>
       </a:lvl5pPr>
-      <a:lvl6pPr marL="1714500" algn="l" defTabSz="685800" rtl="0" eaLnBrk="1" latinLnBrk="0" hangingPunct="1">
-        <a:defRPr sz="1350" kern="1200">
+      <a:lvl6pPr marL="2286000" algn="l" defTabSz="914400" rtl="0" eaLnBrk="1" latinLnBrk="0" hangingPunct="1">
+        <a:defRPr sz="1800" kern="1200">
           <a:solidFill>
             <a:schemeClr val="tx1"/>
           </a:solidFill>
@@ -2919,8 +2920,8 @@
           <a:cs typeface="+mn-cs"/>
         </a:defRPr>
       </a:lvl6pPr>
-      <a:lvl7pPr marL="2057400" algn="l" defTabSz="685800" rtl="0" eaLnBrk="1" latinLnBrk="0" hangingPunct="1">
-        <a:defRPr sz="1350" kern="1200">
+      <a:lvl7pPr marL="2743200" algn="l" defTabSz="914400" rtl="0" eaLnBrk="1" latinLnBrk="0" hangingPunct="1">
+        <a:defRPr sz="1800" kern="1200">
           <a:solidFill>
             <a:schemeClr val="tx1"/>
           </a:solidFill>
@@ -2929,8 +2930,8 @@
           <a:cs typeface="+mn-cs"/>
         </a:defRPr>
       </a:lvl7pPr>
-      <a:lvl8pPr marL="2400300" algn="l" defTabSz="685800" rtl="0" eaLnBrk="1" latinLnBrk="0" hangingPunct="1">
-        <a:defRPr sz="1350" kern="1200">
+      <a:lvl8pPr marL="3200400" algn="l" defTabSz="914400" rtl="0" eaLnBrk="1" latinLnBrk="0" hangingPunct="1">
+        <a:defRPr sz="1800" kern="1200">
           <a:solidFill>
             <a:schemeClr val="tx1"/>
           </a:solidFill>
@@ -2939,8 +2940,8 @@
           <a:cs typeface="+mn-cs"/>
         </a:defRPr>
       </a:lvl8pPr>
-      <a:lvl9pPr marL="2743200" algn="l" defTabSz="685800" rtl="0" eaLnBrk="1" latinLnBrk="0" hangingPunct="1">
-        <a:defRPr sz="1350" kern="1200">
+      <a:lvl9pPr marL="3657600" algn="l" defTabSz="914400" rtl="0" eaLnBrk="1" latinLnBrk="0" hangingPunct="1">
+        <a:defRPr sz="1800" kern="1200">
           <a:solidFill>
             <a:schemeClr val="tx1"/>
           </a:solidFill>
@@ -2986,8 +2987,8 @@
           </p:nvPr>
         </p:nvGraphicFramePr>
         <p:xfrm>
-          <a:off x="804869" y="4971086"/>
-          <a:ext cx="1895799" cy="3328991"/>
+          <a:off x="3095927" y="2796236"/>
+          <a:ext cx="1066387" cy="1872559"/>
         </p:xfrm>
         <a:graphic>
           <a:graphicData uri="http://schemas.openxmlformats.org/drawingml/2006/table">
@@ -2996,7 +2997,7 @@
                 <a:tableStyleId>{5C22544A-7EE6-4342-B048-85BDC9FD1C3A}</a:tableStyleId>
               </a:tblPr>
               <a:tblGrid>
-                <a:gridCol w="1895799">
+                <a:gridCol w="1066387">
                   <a:extLst>
                     <a:ext uri="{9D8B030D-6E8A-4147-A177-3AD203B41FA5}">
                       <a16:colId xmlns:a16="http://schemas.microsoft.com/office/drawing/2014/main" val="1670824812"/>
@@ -3004,20 +3005,20 @@
                   </a:extLst>
                 </a:gridCol>
               </a:tblGrid>
-              <a:tr h="345193">
-                <a:tc>
-                  <a:txBody>
-                    <a:bodyPr/>
-                    <a:lstStyle/>
-                    <a:p>
-                      <a:r>
-                        <a:rPr lang="en-US" sz="1800" dirty="0" err="1" smtClean="0"/>
+              <a:tr h="194171">
+                <a:tc>
+                  <a:txBody>
+                    <a:bodyPr/>
+                    <a:lstStyle/>
+                    <a:p>
+                      <a:r>
+                        <a:rPr lang="en-US" sz="1000" dirty="0" err="1" smtClean="0"/>
                         <a:t>title_basics</a:t>
                       </a:r>
-                      <a:endParaRPr lang="en-US" sz="1800" dirty="0"/>
-                    </a:p>
-                  </a:txBody>
-                  <a:tcPr marL="51435" marR="51435" marT="25718" marB="25718"/>
+                      <a:endParaRPr lang="en-US" sz="1000" dirty="0"/>
+                    </a:p>
+                  </a:txBody>
+                  <a:tcPr marL="28932" marR="28932" marT="14466" marB="14466"/>
                 </a:tc>
                 <a:extLst>
                   <a:ext uri="{0D108BD9-81ED-4DB2-BD59-A6C34878D82A}">
@@ -3025,20 +3026,20 @@
                   </a:ext>
                 </a:extLst>
               </a:tr>
-              <a:tr h="326291">
-                <a:tc>
-                  <a:txBody>
-                    <a:bodyPr/>
-                    <a:lstStyle/>
-                    <a:p>
-                      <a:r>
-                        <a:rPr lang="en-US" sz="1800" dirty="0" err="1" smtClean="0"/>
+              <a:tr h="183539">
+                <a:tc>
+                  <a:txBody>
+                    <a:bodyPr/>
+                    <a:lstStyle/>
+                    <a:p>
+                      <a:r>
+                        <a:rPr lang="en-US" sz="1000" dirty="0" err="1" smtClean="0"/>
                         <a:t>tconst</a:t>
                       </a:r>
-                      <a:endParaRPr lang="en-US" sz="1800" dirty="0" smtClean="0"/>
-                    </a:p>
-                  </a:txBody>
-                  <a:tcPr marL="51435" marR="51435" marT="25718" marB="25718"/>
+                      <a:endParaRPr lang="en-US" sz="1000" dirty="0" smtClean="0"/>
+                    </a:p>
+                  </a:txBody>
+                  <a:tcPr marL="28932" marR="28932" marT="14466" marB="14466"/>
                 </a:tc>
                 <a:extLst>
                   <a:ext uri="{0D108BD9-81ED-4DB2-BD59-A6C34878D82A}">
@@ -3046,20 +3047,20 @@
                   </a:ext>
                 </a:extLst>
               </a:tr>
-              <a:tr h="326291">
-                <a:tc>
-                  <a:txBody>
-                    <a:bodyPr/>
-                    <a:lstStyle/>
-                    <a:p>
-                      <a:r>
-                        <a:rPr lang="en-US" sz="1800" dirty="0" err="1" smtClean="0"/>
+              <a:tr h="183539">
+                <a:tc>
+                  <a:txBody>
+                    <a:bodyPr/>
+                    <a:lstStyle/>
+                    <a:p>
+                      <a:r>
+                        <a:rPr lang="en-US" sz="1000" dirty="0" err="1" smtClean="0"/>
                         <a:t>titleType</a:t>
                       </a:r>
-                      <a:endParaRPr lang="en-US" sz="1800" dirty="0"/>
-                    </a:p>
-                  </a:txBody>
-                  <a:tcPr marL="51435" marR="51435" marT="25718" marB="25718"/>
+                      <a:endParaRPr lang="en-US" sz="1000" dirty="0"/>
+                    </a:p>
+                  </a:txBody>
+                  <a:tcPr marL="28932" marR="28932" marT="14466" marB="14466"/>
                 </a:tc>
                 <a:extLst>
                   <a:ext uri="{0D108BD9-81ED-4DB2-BD59-A6C34878D82A}">
@@ -3067,20 +3068,20 @@
                   </a:ext>
                 </a:extLst>
               </a:tr>
-              <a:tr h="356738">
-                <a:tc>
-                  <a:txBody>
-                    <a:bodyPr/>
-                    <a:lstStyle/>
-                    <a:p>
-                      <a:r>
-                        <a:rPr lang="en-US" sz="1800" dirty="0" err="1" smtClean="0"/>
+              <a:tr h="200665">
+                <a:tc>
+                  <a:txBody>
+                    <a:bodyPr/>
+                    <a:lstStyle/>
+                    <a:p>
+                      <a:r>
+                        <a:rPr lang="en-US" sz="1000" dirty="0" err="1" smtClean="0"/>
                         <a:t>primaryTitle</a:t>
                       </a:r>
-                      <a:endParaRPr lang="en-US" sz="1800" dirty="0"/>
-                    </a:p>
-                  </a:txBody>
-                  <a:tcPr marL="51435" marR="51435" marT="25718" marB="25718"/>
+                      <a:endParaRPr lang="en-US" sz="1000" dirty="0"/>
+                    </a:p>
+                  </a:txBody>
+                  <a:tcPr marL="28932" marR="28932" marT="14466" marB="14466"/>
                 </a:tc>
                 <a:extLst>
                   <a:ext uri="{0D108BD9-81ED-4DB2-BD59-A6C34878D82A}">
@@ -3088,20 +3089,20 @@
                   </a:ext>
                 </a:extLst>
               </a:tr>
-              <a:tr h="329750">
-                <a:tc>
-                  <a:txBody>
-                    <a:bodyPr/>
-                    <a:lstStyle/>
-                    <a:p>
-                      <a:r>
-                        <a:rPr lang="en-US" sz="1800" dirty="0" err="1" smtClean="0"/>
+              <a:tr h="185484">
+                <a:tc>
+                  <a:txBody>
+                    <a:bodyPr/>
+                    <a:lstStyle/>
+                    <a:p>
+                      <a:r>
+                        <a:rPr lang="en-US" sz="1000" dirty="0" err="1" smtClean="0"/>
                         <a:t>originalTitle</a:t>
                       </a:r>
-                      <a:endParaRPr lang="en-US" sz="1800" dirty="0"/>
-                    </a:p>
-                  </a:txBody>
-                  <a:tcPr marL="51435" marR="51435" marT="25718" marB="25718"/>
+                      <a:endParaRPr lang="en-US" sz="1000" dirty="0"/>
+                    </a:p>
+                  </a:txBody>
+                  <a:tcPr marL="28932" marR="28932" marT="14466" marB="14466"/>
                 </a:tc>
                 <a:extLst>
                   <a:ext uri="{0D108BD9-81ED-4DB2-BD59-A6C34878D82A}">
@@ -3109,20 +3110,20 @@
                   </a:ext>
                 </a:extLst>
               </a:tr>
-              <a:tr h="326291">
-                <a:tc>
-                  <a:txBody>
-                    <a:bodyPr/>
-                    <a:lstStyle/>
-                    <a:p>
-                      <a:r>
-                        <a:rPr lang="en-US" sz="1800" dirty="0" err="1" smtClean="0"/>
+              <a:tr h="183539">
+                <a:tc>
+                  <a:txBody>
+                    <a:bodyPr/>
+                    <a:lstStyle/>
+                    <a:p>
+                      <a:r>
+                        <a:rPr lang="en-US" sz="1000" dirty="0" err="1" smtClean="0"/>
                         <a:t>isAdult</a:t>
                       </a:r>
-                      <a:endParaRPr lang="en-US" sz="1800" dirty="0"/>
-                    </a:p>
-                  </a:txBody>
-                  <a:tcPr marL="51435" marR="51435" marT="25718" marB="25718"/>
+                      <a:endParaRPr lang="en-US" sz="1000" dirty="0"/>
+                    </a:p>
+                  </a:txBody>
+                  <a:tcPr marL="28932" marR="28932" marT="14466" marB="14466"/>
                 </a:tc>
                 <a:extLst>
                   <a:ext uri="{0D108BD9-81ED-4DB2-BD59-A6C34878D82A}">
@@ -3130,20 +3131,20 @@
                   </a:ext>
                 </a:extLst>
               </a:tr>
-              <a:tr h="326291">
-                <a:tc>
-                  <a:txBody>
-                    <a:bodyPr/>
-                    <a:lstStyle/>
-                    <a:p>
-                      <a:r>
-                        <a:rPr lang="en-US" sz="1800" dirty="0" err="1" smtClean="0"/>
+              <a:tr h="183539">
+                <a:tc>
+                  <a:txBody>
+                    <a:bodyPr/>
+                    <a:lstStyle/>
+                    <a:p>
+                      <a:r>
+                        <a:rPr lang="en-US" sz="1000" dirty="0" err="1" smtClean="0"/>
                         <a:t>startYear</a:t>
                       </a:r>
-                      <a:endParaRPr lang="en-US" sz="1800" dirty="0"/>
-                    </a:p>
-                  </a:txBody>
-                  <a:tcPr marL="51435" marR="51435" marT="25718" marB="25718"/>
+                      <a:endParaRPr lang="en-US" sz="1000" dirty="0"/>
+                    </a:p>
+                  </a:txBody>
+                  <a:tcPr marL="28932" marR="28932" marT="14466" marB="14466"/>
                 </a:tc>
                 <a:extLst>
                   <a:ext uri="{0D108BD9-81ED-4DB2-BD59-A6C34878D82A}">
@@ -3151,20 +3152,20 @@
                   </a:ext>
                 </a:extLst>
               </a:tr>
-              <a:tr h="326291">
-                <a:tc>
-                  <a:txBody>
-                    <a:bodyPr/>
-                    <a:lstStyle/>
-                    <a:p>
-                      <a:r>
-                        <a:rPr lang="en-US" sz="1800" dirty="0" err="1" smtClean="0"/>
+              <a:tr h="183539">
+                <a:tc>
+                  <a:txBody>
+                    <a:bodyPr/>
+                    <a:lstStyle/>
+                    <a:p>
+                      <a:r>
+                        <a:rPr lang="en-US" sz="1000" dirty="0" err="1" smtClean="0"/>
                         <a:t>endYear</a:t>
                       </a:r>
-                      <a:endParaRPr lang="en-US" sz="1800" dirty="0"/>
-                    </a:p>
-                  </a:txBody>
-                  <a:tcPr marL="51435" marR="51435" marT="25718" marB="25718"/>
+                      <a:endParaRPr lang="en-US" sz="1000" dirty="0"/>
+                    </a:p>
+                  </a:txBody>
+                  <a:tcPr marL="28932" marR="28932" marT="14466" marB="14466"/>
                 </a:tc>
                 <a:extLst>
                   <a:ext uri="{0D108BD9-81ED-4DB2-BD59-A6C34878D82A}">
@@ -3172,20 +3173,20 @@
                   </a:ext>
                 </a:extLst>
               </a:tr>
-              <a:tr h="339564">
-                <a:tc>
-                  <a:txBody>
-                    <a:bodyPr/>
-                    <a:lstStyle/>
-                    <a:p>
-                      <a:r>
-                        <a:rPr lang="en-US" sz="1800" dirty="0" err="1" smtClean="0"/>
+              <a:tr h="191005">
+                <a:tc>
+                  <a:txBody>
+                    <a:bodyPr/>
+                    <a:lstStyle/>
+                    <a:p>
+                      <a:r>
+                        <a:rPr lang="en-US" sz="1000" dirty="0" err="1" smtClean="0"/>
                         <a:t>runtimeMinutes</a:t>
                       </a:r>
-                      <a:endParaRPr lang="en-US" sz="1800" dirty="0"/>
-                    </a:p>
-                  </a:txBody>
-                  <a:tcPr marL="51435" marR="51435" marT="25718" marB="25718"/>
+                      <a:endParaRPr lang="en-US" sz="1000" dirty="0"/>
+                    </a:p>
+                  </a:txBody>
+                  <a:tcPr marL="28932" marR="28932" marT="14466" marB="14466"/>
                 </a:tc>
                 <a:extLst>
                   <a:ext uri="{0D108BD9-81ED-4DB2-BD59-A6C34878D82A}">
@@ -3193,20 +3194,20 @@
                   </a:ext>
                 </a:extLst>
               </a:tr>
-              <a:tr h="326291">
-                <a:tc>
-                  <a:txBody>
-                    <a:bodyPr/>
-                    <a:lstStyle/>
-                    <a:p>
-                      <a:r>
-                        <a:rPr lang="en-US" sz="1800" dirty="0" smtClean="0"/>
+              <a:tr h="183539">
+                <a:tc>
+                  <a:txBody>
+                    <a:bodyPr/>
+                    <a:lstStyle/>
+                    <a:p>
+                      <a:r>
+                        <a:rPr lang="en-US" sz="1000" dirty="0" smtClean="0"/>
                         <a:t>genres</a:t>
                       </a:r>
-                      <a:endParaRPr lang="en-US" sz="1800" dirty="0"/>
-                    </a:p>
-                  </a:txBody>
-                  <a:tcPr marL="51435" marR="51435" marT="25718" marB="25718"/>
+                      <a:endParaRPr lang="en-US" sz="1000" dirty="0"/>
+                    </a:p>
+                  </a:txBody>
+                  <a:tcPr marL="28932" marR="28932" marT="14466" marB="14466"/>
                 </a:tc>
                 <a:extLst>
                   <a:ext uri="{0D108BD9-81ED-4DB2-BD59-A6C34878D82A}">
@@ -3233,8 +3234,8 @@
           </p:nvPr>
         </p:nvGraphicFramePr>
         <p:xfrm>
-          <a:off x="804868" y="1636237"/>
-          <a:ext cx="1895801" cy="2366204"/>
+          <a:off x="3095926" y="920383"/>
+          <a:ext cx="1066388" cy="1330991"/>
         </p:xfrm>
         <a:graphic>
           <a:graphicData uri="http://schemas.openxmlformats.org/drawingml/2006/table">
@@ -3243,7 +3244,7 @@
                 <a:tableStyleId>{93296810-A885-4BE3-A3E7-6D5BEEA58F35}</a:tableStyleId>
               </a:tblPr>
               <a:tblGrid>
-                <a:gridCol w="1895801">
+                <a:gridCol w="1066388">
                   <a:extLst>
                     <a:ext uri="{9D8B030D-6E8A-4147-A177-3AD203B41FA5}">
                       <a16:colId xmlns:a16="http://schemas.microsoft.com/office/drawing/2014/main" val="1670824812"/>
@@ -3251,20 +3252,20 @@
                   </a:extLst>
                 </a:gridCol>
               </a:tblGrid>
-              <a:tr h="352052">
-                <a:tc>
-                  <a:txBody>
-                    <a:bodyPr/>
-                    <a:lstStyle/>
-                    <a:p>
-                      <a:r>
-                        <a:rPr lang="en-US" sz="1800" dirty="0" err="1" smtClean="0"/>
+              <a:tr h="198029">
+                <a:tc>
+                  <a:txBody>
+                    <a:bodyPr/>
+                    <a:lstStyle/>
+                    <a:p>
+                      <a:r>
+                        <a:rPr lang="en-US" sz="1000" dirty="0" err="1" smtClean="0"/>
                         <a:t>name_basics</a:t>
                       </a:r>
-                      <a:endParaRPr lang="en-US" sz="1800" dirty="0"/>
-                    </a:p>
-                  </a:txBody>
-                  <a:tcPr marL="51435" marR="51435" marT="25718" marB="25718"/>
+                      <a:endParaRPr lang="en-US" sz="1000" dirty="0"/>
+                    </a:p>
+                  </a:txBody>
+                  <a:tcPr marL="28932" marR="28932" marT="14466" marB="14466"/>
                 </a:tc>
                 <a:extLst>
                   <a:ext uri="{0D108BD9-81ED-4DB2-BD59-A6C34878D82A}">
@@ -3272,20 +3273,20 @@
                   </a:ext>
                 </a:extLst>
               </a:tr>
-              <a:tr h="326291">
-                <a:tc>
-                  <a:txBody>
-                    <a:bodyPr/>
-                    <a:lstStyle/>
-                    <a:p>
-                      <a:r>
-                        <a:rPr lang="en-US" sz="1800" dirty="0" err="1" smtClean="0"/>
+              <a:tr h="183539">
+                <a:tc>
+                  <a:txBody>
+                    <a:bodyPr/>
+                    <a:lstStyle/>
+                    <a:p>
+                      <a:r>
+                        <a:rPr lang="en-US" sz="1000" dirty="0" err="1" smtClean="0"/>
                         <a:t>nconst</a:t>
                       </a:r>
-                      <a:endParaRPr lang="en-US" sz="1800" dirty="0" smtClean="0"/>
-                    </a:p>
-                  </a:txBody>
-                  <a:tcPr marL="51435" marR="51435" marT="25718" marB="25718"/>
+                      <a:endParaRPr lang="en-US" sz="1000" dirty="0" smtClean="0"/>
+                    </a:p>
+                  </a:txBody>
+                  <a:tcPr marL="28932" marR="28932" marT="14466" marB="14466"/>
                 </a:tc>
                 <a:extLst>
                   <a:ext uri="{0D108BD9-81ED-4DB2-BD59-A6C34878D82A}">
@@ -3293,20 +3294,20 @@
                   </a:ext>
                 </a:extLst>
               </a:tr>
-              <a:tr h="339019">
-                <a:tc>
-                  <a:txBody>
-                    <a:bodyPr/>
-                    <a:lstStyle/>
-                    <a:p>
-                      <a:r>
-                        <a:rPr lang="en-US" sz="1800" dirty="0" err="1" smtClean="0"/>
+              <a:tr h="190698">
+                <a:tc>
+                  <a:txBody>
+                    <a:bodyPr/>
+                    <a:lstStyle/>
+                    <a:p>
+                      <a:r>
+                        <a:rPr lang="en-US" sz="1000" dirty="0" err="1" smtClean="0"/>
                         <a:t>primaryName</a:t>
                       </a:r>
-                      <a:endParaRPr lang="en-US" sz="1800" dirty="0"/>
-                    </a:p>
-                  </a:txBody>
-                  <a:tcPr marL="51435" marR="51435" marT="25718" marB="25718"/>
+                      <a:endParaRPr lang="en-US" sz="1000" dirty="0"/>
+                    </a:p>
+                  </a:txBody>
+                  <a:tcPr marL="28932" marR="28932" marT="14466" marB="14466"/>
                 </a:tc>
                 <a:extLst>
                   <a:ext uri="{0D108BD9-81ED-4DB2-BD59-A6C34878D82A}">
@@ -3314,20 +3315,20 @@
                   </a:ext>
                 </a:extLst>
               </a:tr>
-              <a:tr h="326291">
-                <a:tc>
-                  <a:txBody>
-                    <a:bodyPr/>
-                    <a:lstStyle/>
-                    <a:p>
-                      <a:r>
-                        <a:rPr lang="en-US" sz="1800" dirty="0" err="1" smtClean="0"/>
+              <a:tr h="183539">
+                <a:tc>
+                  <a:txBody>
+                    <a:bodyPr/>
+                    <a:lstStyle/>
+                    <a:p>
+                      <a:r>
+                        <a:rPr lang="en-US" sz="1000" dirty="0" err="1" smtClean="0"/>
                         <a:t>birthYear</a:t>
                       </a:r>
-                      <a:endParaRPr lang="en-US" sz="1800" dirty="0"/>
-                    </a:p>
-                  </a:txBody>
-                  <a:tcPr marL="51435" marR="51435" marT="25718" marB="25718"/>
+                      <a:endParaRPr lang="en-US" sz="1000" dirty="0"/>
+                    </a:p>
+                  </a:txBody>
+                  <a:tcPr marL="28932" marR="28932" marT="14466" marB="14466"/>
                 </a:tc>
                 <a:extLst>
                   <a:ext uri="{0D108BD9-81ED-4DB2-BD59-A6C34878D82A}">
@@ -3335,20 +3336,20 @@
                   </a:ext>
                 </a:extLst>
               </a:tr>
-              <a:tr h="326291">
-                <a:tc>
-                  <a:txBody>
-                    <a:bodyPr/>
-                    <a:lstStyle/>
-                    <a:p>
-                      <a:r>
-                        <a:rPr lang="en-US" sz="1800" dirty="0" err="1" smtClean="0"/>
+              <a:tr h="183539">
+                <a:tc>
+                  <a:txBody>
+                    <a:bodyPr/>
+                    <a:lstStyle/>
+                    <a:p>
+                      <a:r>
+                        <a:rPr lang="en-US" sz="1000" dirty="0" err="1" smtClean="0"/>
                         <a:t>deathYear</a:t>
                       </a:r>
-                      <a:endParaRPr lang="en-US" sz="1800" dirty="0"/>
-                    </a:p>
-                  </a:txBody>
-                  <a:tcPr marL="51435" marR="51435" marT="25718" marB="25718"/>
+                      <a:endParaRPr lang="en-US" sz="1000" dirty="0"/>
+                    </a:p>
+                  </a:txBody>
+                  <a:tcPr marL="28932" marR="28932" marT="14466" marB="14466"/>
                 </a:tc>
                 <a:extLst>
                   <a:ext uri="{0D108BD9-81ED-4DB2-BD59-A6C34878D82A}">
@@ -3356,20 +3357,20 @@
                   </a:ext>
                 </a:extLst>
               </a:tr>
-              <a:tr h="340787">
-                <a:tc>
-                  <a:txBody>
-                    <a:bodyPr/>
-                    <a:lstStyle/>
-                    <a:p>
-                      <a:r>
-                        <a:rPr lang="en-US" sz="1800" dirty="0" err="1" smtClean="0"/>
+              <a:tr h="191693">
+                <a:tc>
+                  <a:txBody>
+                    <a:bodyPr/>
+                    <a:lstStyle/>
+                    <a:p>
+                      <a:r>
+                        <a:rPr lang="en-US" sz="1000" dirty="0" err="1" smtClean="0"/>
                         <a:t>primaryProfession</a:t>
                       </a:r>
-                      <a:endParaRPr lang="en-US" sz="1800" dirty="0"/>
-                    </a:p>
-                  </a:txBody>
-                  <a:tcPr marL="51435" marR="51435" marT="25718" marB="25718"/>
+                      <a:endParaRPr lang="en-US" sz="1000" dirty="0"/>
+                    </a:p>
+                  </a:txBody>
+                  <a:tcPr marL="28932" marR="28932" marT="14466" marB="14466"/>
                 </a:tc>
                 <a:extLst>
                   <a:ext uri="{0D108BD9-81ED-4DB2-BD59-A6C34878D82A}">
@@ -3377,20 +3378,20 @@
                   </a:ext>
                 </a:extLst>
               </a:tr>
-              <a:tr h="355473">
-                <a:tc>
-                  <a:txBody>
-                    <a:bodyPr/>
-                    <a:lstStyle/>
-                    <a:p>
-                      <a:r>
-                        <a:rPr lang="en-US" sz="1800" dirty="0" err="1" smtClean="0"/>
+              <a:tr h="199954">
+                <a:tc>
+                  <a:txBody>
+                    <a:bodyPr/>
+                    <a:lstStyle/>
+                    <a:p>
+                      <a:r>
+                        <a:rPr lang="en-US" sz="1000" dirty="0" err="1" smtClean="0"/>
                         <a:t>knownForTitles</a:t>
                       </a:r>
-                      <a:endParaRPr lang="en-US" sz="1800" dirty="0" smtClean="0"/>
-                    </a:p>
-                  </a:txBody>
-                  <a:tcPr marL="51435" marR="51435" marT="25718" marB="25718"/>
+                      <a:endParaRPr lang="en-US" sz="1000" dirty="0" smtClean="0"/>
+                    </a:p>
+                  </a:txBody>
+                  <a:tcPr marL="28932" marR="28932" marT="14466" marB="14466"/>
                 </a:tc>
                 <a:extLst>
                   <a:ext uri="{0D108BD9-81ED-4DB2-BD59-A6C34878D82A}">
@@ -3417,8 +3418,8 @@
           </p:nvPr>
         </p:nvGraphicFramePr>
         <p:xfrm>
-          <a:off x="3697165" y="5636225"/>
-          <a:ext cx="1746391" cy="1304094"/>
+          <a:off x="4722843" y="3170377"/>
+          <a:ext cx="982345" cy="733554"/>
         </p:xfrm>
         <a:graphic>
           <a:graphicData uri="http://schemas.openxmlformats.org/drawingml/2006/table">
@@ -3427,7 +3428,7 @@
                 <a:tableStyleId>{5C22544A-7EE6-4342-B048-85BDC9FD1C3A}</a:tableStyleId>
               </a:tblPr>
               <a:tblGrid>
-                <a:gridCol w="1746391">
+                <a:gridCol w="982345">
                   <a:extLst>
                     <a:ext uri="{9D8B030D-6E8A-4147-A177-3AD203B41FA5}">
                       <a16:colId xmlns:a16="http://schemas.microsoft.com/office/drawing/2014/main" val="1670824812"/>
@@ -3435,20 +3436,20 @@
                   </a:extLst>
                 </a:gridCol>
               </a:tblGrid>
-              <a:tr h="308646">
-                <a:tc>
-                  <a:txBody>
-                    <a:bodyPr/>
-                    <a:lstStyle/>
-                    <a:p>
-                      <a:r>
-                        <a:rPr lang="en-US" sz="1800" dirty="0" err="1" smtClean="0"/>
+              <a:tr h="183238">
+                <a:tc>
+                  <a:txBody>
+                    <a:bodyPr/>
+                    <a:lstStyle/>
+                    <a:p>
+                      <a:r>
+                        <a:rPr lang="en-US" sz="1000" dirty="0" err="1" smtClean="0"/>
                         <a:t>title_ratings</a:t>
                       </a:r>
-                      <a:endParaRPr lang="en-US" sz="1800" dirty="0"/>
-                    </a:p>
-                  </a:txBody>
-                  <a:tcPr marL="51435" marR="51435" marT="25718" marB="25718"/>
+                      <a:endParaRPr lang="en-US" sz="1000" dirty="0"/>
+                    </a:p>
+                  </a:txBody>
+                  <a:tcPr marL="28932" marR="28932" marT="14466" marB="14466"/>
                 </a:tc>
                 <a:extLst>
                   <a:ext uri="{0D108BD9-81ED-4DB2-BD59-A6C34878D82A}">
@@ -3456,20 +3457,20 @@
                   </a:ext>
                 </a:extLst>
               </a:tr>
-              <a:tr h="326291">
-                <a:tc>
-                  <a:txBody>
-                    <a:bodyPr/>
-                    <a:lstStyle/>
-                    <a:p>
-                      <a:r>
-                        <a:rPr lang="en-US" sz="1800" dirty="0" err="1" smtClean="0"/>
+              <a:tr h="183539">
+                <a:tc>
+                  <a:txBody>
+                    <a:bodyPr/>
+                    <a:lstStyle/>
+                    <a:p>
+                      <a:r>
+                        <a:rPr lang="en-US" sz="1000" dirty="0" err="1" smtClean="0"/>
                         <a:t>tconst</a:t>
                       </a:r>
-                      <a:endParaRPr lang="en-US" sz="1800" dirty="0" smtClean="0"/>
-                    </a:p>
-                  </a:txBody>
-                  <a:tcPr marL="51435" marR="51435" marT="25718" marB="25718"/>
+                      <a:endParaRPr lang="en-US" sz="1000" dirty="0" smtClean="0"/>
+                    </a:p>
+                  </a:txBody>
+                  <a:tcPr marL="28932" marR="28932" marT="14466" marB="14466"/>
                 </a:tc>
                 <a:extLst>
                   <a:ext uri="{0D108BD9-81ED-4DB2-BD59-A6C34878D82A}">
@@ -3477,20 +3478,20 @@
                   </a:ext>
                 </a:extLst>
               </a:tr>
-              <a:tr h="315818">
-                <a:tc>
-                  <a:txBody>
-                    <a:bodyPr/>
-                    <a:lstStyle/>
-                    <a:p>
-                      <a:r>
-                        <a:rPr lang="en-US" sz="1800" dirty="0" err="1" smtClean="0"/>
+              <a:tr h="183238">
+                <a:tc>
+                  <a:txBody>
+                    <a:bodyPr/>
+                    <a:lstStyle/>
+                    <a:p>
+                      <a:r>
+                        <a:rPr lang="en-US" sz="1000" dirty="0" err="1" smtClean="0"/>
                         <a:t>averageRating</a:t>
                       </a:r>
-                      <a:endParaRPr lang="en-US" sz="1800" dirty="0"/>
-                    </a:p>
-                  </a:txBody>
-                  <a:tcPr marL="51435" marR="51435" marT="25718" marB="25718"/>
+                      <a:endParaRPr lang="en-US" sz="1000" dirty="0"/>
+                    </a:p>
+                  </a:txBody>
+                  <a:tcPr marL="28932" marR="28932" marT="14466" marB="14466"/>
                 </a:tc>
                 <a:extLst>
                   <a:ext uri="{0D108BD9-81ED-4DB2-BD59-A6C34878D82A}">
@@ -3498,20 +3499,20 @@
                   </a:ext>
                 </a:extLst>
               </a:tr>
-              <a:tr h="326291">
-                <a:tc>
-                  <a:txBody>
-                    <a:bodyPr/>
-                    <a:lstStyle/>
-                    <a:p>
-                      <a:r>
-                        <a:rPr lang="en-US" sz="1800" dirty="0" err="1" smtClean="0"/>
+              <a:tr h="183539">
+                <a:tc>
+                  <a:txBody>
+                    <a:bodyPr/>
+                    <a:lstStyle/>
+                    <a:p>
+                      <a:r>
+                        <a:rPr lang="en-US" sz="1000" dirty="0" err="1" smtClean="0"/>
                         <a:t>numVotes</a:t>
                       </a:r>
-                      <a:endParaRPr lang="en-US" sz="1800" dirty="0" smtClean="0"/>
-                    </a:p>
-                  </a:txBody>
-                  <a:tcPr marL="51435" marR="51435" marT="25718" marB="25718"/>
+                      <a:endParaRPr lang="en-US" sz="1000" dirty="0" smtClean="0"/>
+                    </a:p>
+                  </a:txBody>
+                  <a:tcPr marL="28932" marR="28932" marT="14466" marB="14466"/>
                 </a:tc>
                 <a:extLst>
                   <a:ext uri="{0D108BD9-81ED-4DB2-BD59-A6C34878D82A}">
@@ -3538,8 +3539,8 @@
           </p:nvPr>
         </p:nvGraphicFramePr>
         <p:xfrm>
-          <a:off x="3720178" y="1199345"/>
-          <a:ext cx="1723378" cy="2283502"/>
+          <a:off x="4735788" y="674632"/>
+          <a:ext cx="969400" cy="1284472"/>
         </p:xfrm>
         <a:graphic>
           <a:graphicData uri="http://schemas.openxmlformats.org/drawingml/2006/table">
@@ -3548,7 +3549,7 @@
                 <a:tableStyleId>{5C22544A-7EE6-4342-B048-85BDC9FD1C3A}</a:tableStyleId>
               </a:tblPr>
               <a:tblGrid>
-                <a:gridCol w="1723378">
+                <a:gridCol w="969400">
                   <a:extLst>
                     <a:ext uri="{9D8B030D-6E8A-4147-A177-3AD203B41FA5}">
                       <a16:colId xmlns:a16="http://schemas.microsoft.com/office/drawing/2014/main" val="1670824812"/>
@@ -3556,20 +3557,20 @@
                   </a:extLst>
                 </a:gridCol>
               </a:tblGrid>
-              <a:tr h="320954">
-                <a:tc>
-                  <a:txBody>
-                    <a:bodyPr/>
-                    <a:lstStyle/>
-                    <a:p>
-                      <a:r>
-                        <a:rPr lang="en-US" sz="1800" dirty="0" err="1" smtClean="0"/>
+              <a:tr h="183238">
+                <a:tc>
+                  <a:txBody>
+                    <a:bodyPr/>
+                    <a:lstStyle/>
+                    <a:p>
+                      <a:r>
+                        <a:rPr lang="en-US" sz="1000" dirty="0" err="1" smtClean="0"/>
                         <a:t>title_principals</a:t>
                       </a:r>
-                      <a:endParaRPr lang="en-US" sz="1800" dirty="0"/>
-                    </a:p>
-                  </a:txBody>
-                  <a:tcPr marL="51435" marR="51435" marT="25718" marB="25718"/>
+                      <a:endParaRPr lang="en-US" sz="1000" dirty="0"/>
+                    </a:p>
+                  </a:txBody>
+                  <a:tcPr marL="28932" marR="28932" marT="14466" marB="14466"/>
                 </a:tc>
                 <a:extLst>
                   <a:ext uri="{0D108BD9-81ED-4DB2-BD59-A6C34878D82A}">
@@ -3577,20 +3578,20 @@
                   </a:ext>
                 </a:extLst>
               </a:tr>
-              <a:tr h="326291">
-                <a:tc>
-                  <a:txBody>
-                    <a:bodyPr/>
-                    <a:lstStyle/>
-                    <a:p>
-                      <a:r>
-                        <a:rPr lang="en-US" sz="1800" dirty="0" err="1" smtClean="0"/>
+              <a:tr h="183539">
+                <a:tc>
+                  <a:txBody>
+                    <a:bodyPr/>
+                    <a:lstStyle/>
+                    <a:p>
+                      <a:r>
+                        <a:rPr lang="en-US" sz="1000" dirty="0" err="1" smtClean="0"/>
                         <a:t>tconst</a:t>
                       </a:r>
-                      <a:endParaRPr lang="en-US" sz="1800" dirty="0" smtClean="0"/>
-                    </a:p>
-                  </a:txBody>
-                  <a:tcPr marL="51435" marR="51435" marT="25718" marB="25718"/>
+                      <a:endParaRPr lang="en-US" sz="1000" dirty="0" smtClean="0"/>
+                    </a:p>
+                  </a:txBody>
+                  <a:tcPr marL="28932" marR="28932" marT="14466" marB="14466"/>
                 </a:tc>
                 <a:extLst>
                   <a:ext uri="{0D108BD9-81ED-4DB2-BD59-A6C34878D82A}">
@@ -3598,20 +3599,20 @@
                   </a:ext>
                 </a:extLst>
               </a:tr>
-              <a:tr h="326291">
-                <a:tc>
-                  <a:txBody>
-                    <a:bodyPr/>
-                    <a:lstStyle/>
-                    <a:p>
-                      <a:r>
-                        <a:rPr lang="en-US" sz="1800" dirty="0" smtClean="0"/>
+              <a:tr h="183539">
+                <a:tc>
+                  <a:txBody>
+                    <a:bodyPr/>
+                    <a:lstStyle/>
+                    <a:p>
+                      <a:r>
+                        <a:rPr lang="en-US" sz="1000" dirty="0" smtClean="0"/>
                         <a:t>ordering</a:t>
                       </a:r>
-                      <a:endParaRPr lang="en-US" sz="1800" dirty="0"/>
-                    </a:p>
-                  </a:txBody>
-                  <a:tcPr marL="51435" marR="51435" marT="25718" marB="25718"/>
+                      <a:endParaRPr lang="en-US" sz="1000" dirty="0"/>
+                    </a:p>
+                  </a:txBody>
+                  <a:tcPr marL="28932" marR="28932" marT="14466" marB="14466"/>
                 </a:tc>
                 <a:extLst>
                   <a:ext uri="{0D108BD9-81ED-4DB2-BD59-A6C34878D82A}">
@@ -3619,20 +3620,20 @@
                   </a:ext>
                 </a:extLst>
               </a:tr>
-              <a:tr h="326291">
-                <a:tc>
-                  <a:txBody>
-                    <a:bodyPr/>
-                    <a:lstStyle/>
-                    <a:p>
-                      <a:r>
-                        <a:rPr lang="en-US" sz="1800" dirty="0" err="1" smtClean="0"/>
+              <a:tr h="183539">
+                <a:tc>
+                  <a:txBody>
+                    <a:bodyPr/>
+                    <a:lstStyle/>
+                    <a:p>
+                      <a:r>
+                        <a:rPr lang="en-US" sz="1000" dirty="0" err="1" smtClean="0"/>
                         <a:t>nconst</a:t>
                       </a:r>
-                      <a:endParaRPr lang="en-US" sz="1800" dirty="0"/>
-                    </a:p>
-                  </a:txBody>
-                  <a:tcPr marL="51435" marR="51435" marT="25718" marB="25718"/>
+                      <a:endParaRPr lang="en-US" sz="1000" dirty="0"/>
+                    </a:p>
+                  </a:txBody>
+                  <a:tcPr marL="28932" marR="28932" marT="14466" marB="14466"/>
                 </a:tc>
                 <a:extLst>
                   <a:ext uri="{0D108BD9-81ED-4DB2-BD59-A6C34878D82A}">
@@ -3640,20 +3641,20 @@
                   </a:ext>
                 </a:extLst>
               </a:tr>
-              <a:tr h="326291">
-                <a:tc>
-                  <a:txBody>
-                    <a:bodyPr/>
-                    <a:lstStyle/>
-                    <a:p>
-                      <a:r>
-                        <a:rPr lang="en-US" sz="1800" dirty="0" smtClean="0"/>
+              <a:tr h="183539">
+                <a:tc>
+                  <a:txBody>
+                    <a:bodyPr/>
+                    <a:lstStyle/>
+                    <a:p>
+                      <a:r>
+                        <a:rPr lang="en-US" sz="1000" dirty="0" smtClean="0"/>
                         <a:t>category</a:t>
                       </a:r>
-                      <a:endParaRPr lang="en-US" sz="1800" dirty="0"/>
-                    </a:p>
-                  </a:txBody>
-                  <a:tcPr marL="51435" marR="51435" marT="25718" marB="25718"/>
+                      <a:endParaRPr lang="en-US" sz="1000" dirty="0"/>
+                    </a:p>
+                  </a:txBody>
+                  <a:tcPr marL="28932" marR="28932" marT="14466" marB="14466"/>
                 </a:tc>
                 <a:extLst>
                   <a:ext uri="{0D108BD9-81ED-4DB2-BD59-A6C34878D82A}">
@@ -3661,20 +3662,20 @@
                   </a:ext>
                 </a:extLst>
               </a:tr>
-              <a:tr h="326291">
-                <a:tc>
-                  <a:txBody>
-                    <a:bodyPr/>
-                    <a:lstStyle/>
-                    <a:p>
-                      <a:r>
-                        <a:rPr lang="en-US" sz="1800" dirty="0" smtClean="0"/>
+              <a:tr h="183539">
+                <a:tc>
+                  <a:txBody>
+                    <a:bodyPr/>
+                    <a:lstStyle/>
+                    <a:p>
+                      <a:r>
+                        <a:rPr lang="en-US" sz="1000" dirty="0" smtClean="0"/>
                         <a:t>job</a:t>
                       </a:r>
-                      <a:endParaRPr lang="en-US" sz="1800" dirty="0"/>
-                    </a:p>
-                  </a:txBody>
-                  <a:tcPr marL="51435" marR="51435" marT="25718" marB="25718"/>
+                      <a:endParaRPr lang="en-US" sz="1000" dirty="0"/>
+                    </a:p>
+                  </a:txBody>
+                  <a:tcPr marL="28932" marR="28932" marT="14466" marB="14466"/>
                 </a:tc>
                 <a:extLst>
                   <a:ext uri="{0D108BD9-81ED-4DB2-BD59-A6C34878D82A}">
@@ -3682,20 +3683,20 @@
                   </a:ext>
                 </a:extLst>
               </a:tr>
-              <a:tr h="326291">
-                <a:tc>
-                  <a:txBody>
-                    <a:bodyPr/>
-                    <a:lstStyle/>
-                    <a:p>
-                      <a:r>
-                        <a:rPr lang="en-US" sz="1800" dirty="0" smtClean="0"/>
+              <a:tr h="183539">
+                <a:tc>
+                  <a:txBody>
+                    <a:bodyPr/>
+                    <a:lstStyle/>
+                    <a:p>
+                      <a:r>
+                        <a:rPr lang="en-US" sz="1000" dirty="0" smtClean="0"/>
                         <a:t>characters</a:t>
                       </a:r>
-                      <a:endParaRPr lang="en-US" sz="1800" dirty="0"/>
-                    </a:p>
-                  </a:txBody>
-                  <a:tcPr marL="51435" marR="51435" marT="25718" marB="25718"/>
+                      <a:endParaRPr lang="en-US" sz="1000" dirty="0"/>
+                    </a:p>
+                  </a:txBody>
+                  <a:tcPr marL="28932" marR="28932" marT="14466" marB="14466"/>
                 </a:tc>
                 <a:extLst>
                   <a:ext uri="{0D108BD9-81ED-4DB2-BD59-A6C34878D82A}">
@@ -3722,8 +3723,8 @@
           </p:nvPr>
         </p:nvGraphicFramePr>
         <p:xfrm>
-          <a:off x="3697166" y="3686329"/>
-          <a:ext cx="1746390" cy="1652487"/>
+          <a:off x="4722844" y="2073560"/>
+          <a:ext cx="982344" cy="929525"/>
         </p:xfrm>
         <a:graphic>
           <a:graphicData uri="http://schemas.openxmlformats.org/drawingml/2006/table">
@@ -3732,7 +3733,7 @@
                 <a:tableStyleId>{5C22544A-7EE6-4342-B048-85BDC9FD1C3A}</a:tableStyleId>
               </a:tblPr>
               <a:tblGrid>
-                <a:gridCol w="1746390">
+                <a:gridCol w="982344">
                   <a:extLst>
                     <a:ext uri="{9D8B030D-6E8A-4147-A177-3AD203B41FA5}">
                       <a16:colId xmlns:a16="http://schemas.microsoft.com/office/drawing/2014/main" val="1670824812"/>
@@ -3740,20 +3741,20 @@
                   </a:extLst>
                 </a:gridCol>
               </a:tblGrid>
-              <a:tr h="334050">
-                <a:tc>
-                  <a:txBody>
-                    <a:bodyPr/>
-                    <a:lstStyle/>
-                    <a:p>
-                      <a:r>
-                        <a:rPr lang="en-US" sz="1800" dirty="0" err="1" smtClean="0"/>
+              <a:tr h="187903">
+                <a:tc>
+                  <a:txBody>
+                    <a:bodyPr/>
+                    <a:lstStyle/>
+                    <a:p>
+                      <a:r>
+                        <a:rPr lang="en-US" sz="1000" dirty="0" err="1" smtClean="0"/>
                         <a:t>title_episode</a:t>
                       </a:r>
-                      <a:endParaRPr lang="en-US" sz="1800" dirty="0"/>
-                    </a:p>
-                  </a:txBody>
-                  <a:tcPr marL="51435" marR="51435" marT="25718" marB="25718"/>
+                      <a:endParaRPr lang="en-US" sz="1000" dirty="0"/>
+                    </a:p>
+                  </a:txBody>
+                  <a:tcPr marL="28932" marR="28932" marT="14466" marB="14466"/>
                 </a:tc>
                 <a:extLst>
                   <a:ext uri="{0D108BD9-81ED-4DB2-BD59-A6C34878D82A}">
@@ -3761,20 +3762,20 @@
                   </a:ext>
                 </a:extLst>
               </a:tr>
-              <a:tr h="326291">
-                <a:tc>
-                  <a:txBody>
-                    <a:bodyPr/>
-                    <a:lstStyle/>
-                    <a:p>
-                      <a:r>
-                        <a:rPr lang="en-US" sz="1800" dirty="0" err="1" smtClean="0"/>
+              <a:tr h="183539">
+                <a:tc>
+                  <a:txBody>
+                    <a:bodyPr/>
+                    <a:lstStyle/>
+                    <a:p>
+                      <a:r>
+                        <a:rPr lang="en-US" sz="1000" dirty="0" err="1" smtClean="0"/>
                         <a:t>tconst</a:t>
                       </a:r>
-                      <a:endParaRPr lang="en-US" sz="1800" dirty="0" smtClean="0"/>
-                    </a:p>
-                  </a:txBody>
-                  <a:tcPr marL="51435" marR="51435" marT="25718" marB="25718"/>
+                      <a:endParaRPr lang="en-US" sz="1000" dirty="0" smtClean="0"/>
+                    </a:p>
+                  </a:txBody>
+                  <a:tcPr marL="28932" marR="28932" marT="14466" marB="14466"/>
                 </a:tc>
                 <a:extLst>
                   <a:ext uri="{0D108BD9-81ED-4DB2-BD59-A6C34878D82A}">
@@ -3782,20 +3783,20 @@
                   </a:ext>
                 </a:extLst>
               </a:tr>
-              <a:tr h="311663">
-                <a:tc>
-                  <a:txBody>
-                    <a:bodyPr/>
-                    <a:lstStyle/>
-                    <a:p>
-                      <a:r>
-                        <a:rPr lang="en-US" sz="1800" dirty="0" err="1" smtClean="0"/>
+              <a:tr h="183238">
+                <a:tc>
+                  <a:txBody>
+                    <a:bodyPr/>
+                    <a:lstStyle/>
+                    <a:p>
+                      <a:r>
+                        <a:rPr lang="en-US" sz="1000" dirty="0" err="1" smtClean="0"/>
                         <a:t>parentTconst</a:t>
                       </a:r>
-                      <a:endParaRPr lang="en-US" sz="1800" dirty="0"/>
-                    </a:p>
-                  </a:txBody>
-                  <a:tcPr marL="51435" marR="51435" marT="25718" marB="25718"/>
+                      <a:endParaRPr lang="en-US" sz="1000" dirty="0"/>
+                    </a:p>
+                  </a:txBody>
+                  <a:tcPr marL="28932" marR="28932" marT="14466" marB="14466"/>
                 </a:tc>
                 <a:extLst>
                   <a:ext uri="{0D108BD9-81ED-4DB2-BD59-A6C34878D82A}">
@@ -3803,20 +3804,20 @@
                   </a:ext>
                 </a:extLst>
               </a:tr>
-              <a:tr h="326149">
-                <a:tc>
-                  <a:txBody>
-                    <a:bodyPr/>
-                    <a:lstStyle/>
-                    <a:p>
-                      <a:r>
-                        <a:rPr lang="en-US" sz="1800" dirty="0" err="1" smtClean="0"/>
+              <a:tr h="183459">
+                <a:tc>
+                  <a:txBody>
+                    <a:bodyPr/>
+                    <a:lstStyle/>
+                    <a:p>
+                      <a:r>
+                        <a:rPr lang="en-US" sz="1000" dirty="0" err="1" smtClean="0"/>
                         <a:t>seasonNumber</a:t>
                       </a:r>
-                      <a:endParaRPr lang="en-US" sz="1800" dirty="0"/>
-                    </a:p>
-                  </a:txBody>
-                  <a:tcPr marL="51435" marR="51435" marT="25718" marB="25718"/>
+                      <a:endParaRPr lang="en-US" sz="1000" dirty="0"/>
+                    </a:p>
+                  </a:txBody>
+                  <a:tcPr marL="28932" marR="28932" marT="14466" marB="14466"/>
                 </a:tc>
                 <a:extLst>
                   <a:ext uri="{0D108BD9-81ED-4DB2-BD59-A6C34878D82A}">
@@ -3824,20 +3825,20 @@
                   </a:ext>
                 </a:extLst>
               </a:tr>
-              <a:tr h="340241">
-                <a:tc>
-                  <a:txBody>
-                    <a:bodyPr/>
-                    <a:lstStyle/>
-                    <a:p>
-                      <a:r>
-                        <a:rPr lang="en-US" sz="1800" dirty="0" err="1" smtClean="0"/>
+              <a:tr h="191386">
+                <a:tc>
+                  <a:txBody>
+                    <a:bodyPr/>
+                    <a:lstStyle/>
+                    <a:p>
+                      <a:r>
+                        <a:rPr lang="en-US" sz="1000" dirty="0" err="1" smtClean="0"/>
                         <a:t>episodeNumber</a:t>
                       </a:r>
-                      <a:endParaRPr lang="en-US" sz="1800" dirty="0"/>
-                    </a:p>
-                  </a:txBody>
-                  <a:tcPr marL="51435" marR="51435" marT="25718" marB="25718"/>
+                      <a:endParaRPr lang="en-US" sz="1000" dirty="0"/>
+                    </a:p>
+                  </a:txBody>
+                  <a:tcPr marL="28932" marR="28932" marT="14466" marB="14466"/>
                 </a:tc>
                 <a:extLst>
                   <a:ext uri="{0D108BD9-81ED-4DB2-BD59-A6C34878D82A}">
@@ -3864,8 +3865,8 @@
           </p:nvPr>
         </p:nvGraphicFramePr>
         <p:xfrm>
-          <a:off x="3708672" y="7177949"/>
-          <a:ext cx="1734884" cy="1305164"/>
+          <a:off x="4729316" y="4037596"/>
+          <a:ext cx="975872" cy="734156"/>
         </p:xfrm>
         <a:graphic>
           <a:graphicData uri="http://schemas.openxmlformats.org/drawingml/2006/table">
@@ -3874,7 +3875,7 @@
                 <a:tableStyleId>{5C22544A-7EE6-4342-B048-85BDC9FD1C3A}</a:tableStyleId>
               </a:tblPr>
               <a:tblGrid>
-                <a:gridCol w="1734884">
+                <a:gridCol w="975872">
                   <a:extLst>
                     <a:ext uri="{9D8B030D-6E8A-4147-A177-3AD203B41FA5}">
                       <a16:colId xmlns:a16="http://schemas.microsoft.com/office/drawing/2014/main" val="1670824812"/>
@@ -3882,20 +3883,20 @@
                   </a:extLst>
                 </a:gridCol>
               </a:tblGrid>
-              <a:tr h="326291">
-                <a:tc>
-                  <a:txBody>
-                    <a:bodyPr/>
-                    <a:lstStyle/>
-                    <a:p>
-                      <a:r>
-                        <a:rPr lang="en-US" sz="1800" dirty="0" err="1" smtClean="0"/>
+              <a:tr h="183539">
+                <a:tc>
+                  <a:txBody>
+                    <a:bodyPr/>
+                    <a:lstStyle/>
+                    <a:p>
+                      <a:r>
+                        <a:rPr lang="en-US" sz="1000" dirty="0" err="1" smtClean="0"/>
                         <a:t>title_crew</a:t>
                       </a:r>
-                      <a:endParaRPr lang="en-US" sz="1800" dirty="0"/>
-                    </a:p>
-                  </a:txBody>
-                  <a:tcPr marL="51435" marR="51435" marT="25718" marB="25718"/>
+                      <a:endParaRPr lang="en-US" sz="1000" dirty="0"/>
+                    </a:p>
+                  </a:txBody>
+                  <a:tcPr marL="28932" marR="28932" marT="14466" marB="14466"/>
                 </a:tc>
                 <a:extLst>
                   <a:ext uri="{0D108BD9-81ED-4DB2-BD59-A6C34878D82A}">
@@ -3903,20 +3904,20 @@
                   </a:ext>
                 </a:extLst>
               </a:tr>
-              <a:tr h="326291">
-                <a:tc>
-                  <a:txBody>
-                    <a:bodyPr/>
-                    <a:lstStyle/>
-                    <a:p>
-                      <a:r>
-                        <a:rPr lang="en-US" sz="1800" dirty="0" err="1" smtClean="0"/>
+              <a:tr h="183539">
+                <a:tc>
+                  <a:txBody>
+                    <a:bodyPr/>
+                    <a:lstStyle/>
+                    <a:p>
+                      <a:r>
+                        <a:rPr lang="en-US" sz="1000" dirty="0" err="1" smtClean="0"/>
                         <a:t>tconst</a:t>
                       </a:r>
-                      <a:endParaRPr lang="en-US" sz="1800" dirty="0" smtClean="0"/>
-                    </a:p>
-                  </a:txBody>
-                  <a:tcPr marL="51435" marR="51435" marT="25718" marB="25718"/>
+                      <a:endParaRPr lang="en-US" sz="1000" dirty="0" smtClean="0"/>
+                    </a:p>
+                  </a:txBody>
+                  <a:tcPr marL="28932" marR="28932" marT="14466" marB="14466"/>
                 </a:tc>
                 <a:extLst>
                   <a:ext uri="{0D108BD9-81ED-4DB2-BD59-A6C34878D82A}">
@@ -3924,20 +3925,20 @@
                   </a:ext>
                 </a:extLst>
               </a:tr>
-              <a:tr h="326291">
-                <a:tc>
-                  <a:txBody>
-                    <a:bodyPr/>
-                    <a:lstStyle/>
-                    <a:p>
-                      <a:r>
-                        <a:rPr lang="en-US" sz="1800" dirty="0" smtClean="0"/>
+              <a:tr h="183539">
+                <a:tc>
+                  <a:txBody>
+                    <a:bodyPr/>
+                    <a:lstStyle/>
+                    <a:p>
+                      <a:r>
+                        <a:rPr lang="en-US" sz="1000" dirty="0" smtClean="0"/>
                         <a:t>directors</a:t>
                       </a:r>
-                      <a:endParaRPr lang="en-US" sz="1800" dirty="0"/>
-                    </a:p>
-                  </a:txBody>
-                  <a:tcPr marL="51435" marR="51435" marT="25718" marB="25718"/>
+                      <a:endParaRPr lang="en-US" sz="1000" dirty="0"/>
+                    </a:p>
+                  </a:txBody>
+                  <a:tcPr marL="28932" marR="28932" marT="14466" marB="14466"/>
                 </a:tc>
                 <a:extLst>
                   <a:ext uri="{0D108BD9-81ED-4DB2-BD59-A6C34878D82A}">
@@ -3945,20 +3946,20 @@
                   </a:ext>
                 </a:extLst>
               </a:tr>
-              <a:tr h="326291">
-                <a:tc>
-                  <a:txBody>
-                    <a:bodyPr/>
-                    <a:lstStyle/>
-                    <a:p>
-                      <a:r>
-                        <a:rPr lang="en-US" sz="1800" dirty="0" smtClean="0"/>
+              <a:tr h="183539">
+                <a:tc>
+                  <a:txBody>
+                    <a:bodyPr/>
+                    <a:lstStyle/>
+                    <a:p>
+                      <a:r>
+                        <a:rPr lang="en-US" sz="1000" dirty="0" smtClean="0"/>
                         <a:t>writers</a:t>
                       </a:r>
-                      <a:endParaRPr lang="en-US" sz="1800" dirty="0"/>
-                    </a:p>
-                  </a:txBody>
-                  <a:tcPr marL="51435" marR="51435" marT="25718" marB="25718"/>
+                      <a:endParaRPr lang="en-US" sz="1000" dirty="0"/>
+                    </a:p>
+                  </a:txBody>
+                  <a:tcPr marL="28932" marR="28932" marT="14466" marB="14466"/>
                 </a:tc>
                 <a:extLst>
                   <a:ext uri="{0D108BD9-81ED-4DB2-BD59-A6C34878D82A}">
@@ -3978,8 +3979,8 @@
         </p:nvCxnSpPr>
         <p:spPr>
           <a:xfrm flipH="1" flipV="1">
-            <a:off x="2680245" y="3791457"/>
-            <a:ext cx="909116" cy="2346606"/>
+            <a:off x="4150825" y="2132695"/>
+            <a:ext cx="511378" cy="1319966"/>
           </a:xfrm>
           <a:prstGeom prst="line">
             <a:avLst/>
@@ -4013,8 +4014,8 @@
         </p:nvSpPr>
         <p:spPr>
           <a:xfrm>
-            <a:off x="771092" y="-993822"/>
-            <a:ext cx="1343946" cy="248209"/>
+            <a:off x="3076927" y="-559025"/>
+            <a:ext cx="755970" cy="180049"/>
           </a:xfrm>
           <a:prstGeom prst="rect">
             <a:avLst/>
@@ -4028,10 +4029,9 @@
           <a:lstStyle/>
           <a:p>
             <a:r>
-              <a:rPr lang="en-US" sz="1013" b="1" dirty="0"/>
+              <a:rPr lang="en-US" sz="570" b="1" dirty="0"/>
               <a:t>Names of people</a:t>
             </a:r>
-            <a:endParaRPr lang="en-US" sz="1013" b="1" dirty="0"/>
           </a:p>
         </p:txBody>
       </p:sp>
@@ -4043,8 +4043,8 @@
         </p:nvCxnSpPr>
         <p:spPr>
           <a:xfrm flipV="1">
-            <a:off x="2680244" y="1719677"/>
-            <a:ext cx="909117" cy="2062576"/>
+            <a:off x="4150825" y="967318"/>
+            <a:ext cx="511378" cy="1160199"/>
           </a:xfrm>
           <a:prstGeom prst="line">
             <a:avLst/>
@@ -4078,8 +4078,8 @@
         </p:nvCxnSpPr>
         <p:spPr>
           <a:xfrm>
-            <a:off x="2680244" y="3789009"/>
-            <a:ext cx="909117" cy="347601"/>
+            <a:off x="4150825" y="2131318"/>
+            <a:ext cx="511378" cy="195526"/>
           </a:xfrm>
           <a:prstGeom prst="line">
             <a:avLst/>
@@ -4113,8 +4113,8 @@
         </p:nvCxnSpPr>
         <p:spPr>
           <a:xfrm flipH="1" flipV="1">
-            <a:off x="2680245" y="3802598"/>
-            <a:ext cx="909116" cy="3862752"/>
+            <a:off x="4150825" y="2138961"/>
+            <a:ext cx="511378" cy="2172798"/>
           </a:xfrm>
           <a:prstGeom prst="line">
             <a:avLst/>
@@ -4148,8 +4148,8 @@
         </p:nvCxnSpPr>
         <p:spPr>
           <a:xfrm flipH="1" flipV="1">
-            <a:off x="2729450" y="5468198"/>
-            <a:ext cx="859911" cy="694084"/>
+            <a:off x="4178503" y="3075862"/>
+            <a:ext cx="483700" cy="390422"/>
           </a:xfrm>
           <a:prstGeom prst="line">
             <a:avLst/>
@@ -4182,8 +4182,8 @@
         </p:nvCxnSpPr>
         <p:spPr>
           <a:xfrm flipV="1">
-            <a:off x="2729449" y="1733266"/>
-            <a:ext cx="859912" cy="3725727"/>
+            <a:off x="4178502" y="974963"/>
+            <a:ext cx="483701" cy="2095721"/>
           </a:xfrm>
           <a:prstGeom prst="line">
             <a:avLst/>
@@ -4216,8 +4216,8 @@
         </p:nvCxnSpPr>
         <p:spPr>
           <a:xfrm flipV="1">
-            <a:off x="2729449" y="4143366"/>
-            <a:ext cx="859912" cy="1322383"/>
+            <a:off x="4178502" y="2330644"/>
+            <a:ext cx="483701" cy="743840"/>
           </a:xfrm>
           <a:prstGeom prst="line">
             <a:avLst/>
@@ -4250,8 +4250,8 @@
         </p:nvCxnSpPr>
         <p:spPr>
           <a:xfrm flipH="1" flipV="1">
-            <a:off x="2729451" y="5479338"/>
-            <a:ext cx="859910" cy="2186012"/>
+            <a:off x="4178504" y="3082128"/>
+            <a:ext cx="483699" cy="1229632"/>
           </a:xfrm>
           <a:prstGeom prst="line">
             <a:avLst/>
@@ -4284,8 +4284,8 @@
         </p:nvSpPr>
         <p:spPr>
           <a:xfrm>
-            <a:off x="478465" y="3806450"/>
-            <a:ext cx="264485" cy="1652544"/>
+            <a:off x="2912324" y="2141128"/>
+            <a:ext cx="148773" cy="929556"/>
           </a:xfrm>
           <a:prstGeom prst="leftBracket">
             <a:avLst/>
@@ -4313,7 +4313,7 @@
           </a:fontRef>
         </p:style>
         <p:txBody>
-          <a:bodyPr rot="0" spcFirstLastPara="0" vertOverflow="overflow" horzOverflow="overflow" vert="horz" wrap="square" lIns="51435" tIns="25718" rIns="51435" bIns="25718" numCol="1" spcCol="0" rtlCol="0" fromWordArt="0" anchor="ctr" anchorCtr="0" forceAA="0" compatLnSpc="1">
+          <a:bodyPr rot="0" spcFirstLastPara="0" vertOverflow="overflow" horzOverflow="overflow" vert="horz" wrap="square" lIns="28932" tIns="14466" rIns="28932" bIns="14466" numCol="1" spcCol="0" rtlCol="0" fromWordArt="0" anchor="ctr" anchorCtr="0" forceAA="0" compatLnSpc="1">
             <a:prstTxWarp prst="textNoShape">
               <a:avLst/>
             </a:prstTxWarp>
@@ -4322,7 +4322,7 @@
           <a:lstStyle/>
           <a:p>
             <a:pPr algn="ctr"/>
-            <a:endParaRPr lang="en-US" sz="1013"/>
+            <a:endParaRPr lang="en-US" sz="570"/>
           </a:p>
         </p:txBody>
       </p:sp>
@@ -4330,6 +4330,1092 @@
     <p:extLst>
       <p:ext uri="{BB962C8B-B14F-4D97-AF65-F5344CB8AC3E}">
         <p14:creationId xmlns:p14="http://schemas.microsoft.com/office/powerpoint/2010/main" val="2040377622"/>
+      </p:ext>
+    </p:extLst>
+  </p:cSld>
+  <p:clrMapOvr>
+    <a:masterClrMapping/>
+  </p:clrMapOvr>
+</p:sld>
+</file>
+
+<file path=ppt/slides/slide2.xml><?xml version="1.0" encoding="utf-8"?>
+<p:sld xmlns:a="http://schemas.openxmlformats.org/drawingml/2006/main" xmlns:r="http://schemas.openxmlformats.org/officeDocument/2006/relationships" xmlns:p="http://schemas.openxmlformats.org/presentationml/2006/main">
+  <p:cSld>
+    <p:spTree>
+      <p:nvGrpSpPr>
+        <p:cNvPr id="1" name=""/>
+        <p:cNvGrpSpPr/>
+        <p:nvPr/>
+      </p:nvGrpSpPr>
+      <p:grpSpPr>
+        <a:xfrm>
+          <a:off x="0" y="0"/>
+          <a:ext cx="0" cy="0"/>
+          <a:chOff x="0" y="0"/>
+          <a:chExt cx="0" cy="0"/>
+        </a:xfrm>
+      </p:grpSpPr>
+      <p:graphicFrame>
+        <p:nvGraphicFramePr>
+          <p:cNvPr id="2" name="Table 1"/>
+          <p:cNvGraphicFramePr>
+            <a:graphicFrameLocks noGrp="1"/>
+          </p:cNvGraphicFramePr>
+          <p:nvPr>
+            <p:extLst>
+              <p:ext uri="{D42A27DB-BD31-4B8C-83A1-F6EECF244321}">
+                <p14:modId xmlns:p14="http://schemas.microsoft.com/office/powerpoint/2010/main" val="2270241316"/>
+              </p:ext>
+            </p:extLst>
+          </p:nvPr>
+        </p:nvGraphicFramePr>
+        <p:xfrm>
+          <a:off x="2041245" y="1515700"/>
+          <a:ext cx="1066387" cy="1872559"/>
+        </p:xfrm>
+        <a:graphic>
+          <a:graphicData uri="http://schemas.openxmlformats.org/drawingml/2006/table">
+            <a:tbl>
+              <a:tblPr firstRow="1" bandRow="1">
+                <a:tableStyleId>{5C22544A-7EE6-4342-B048-85BDC9FD1C3A}</a:tableStyleId>
+              </a:tblPr>
+              <a:tblGrid>
+                <a:gridCol w="1066387">
+                  <a:extLst>
+                    <a:ext uri="{9D8B030D-6E8A-4147-A177-3AD203B41FA5}">
+                      <a16:colId xmlns:a16="http://schemas.microsoft.com/office/drawing/2014/main" val="1670824812"/>
+                    </a:ext>
+                  </a:extLst>
+                </a:gridCol>
+              </a:tblGrid>
+              <a:tr h="194171">
+                <a:tc>
+                  <a:txBody>
+                    <a:bodyPr/>
+                    <a:lstStyle/>
+                    <a:p>
+                      <a:r>
+                        <a:rPr lang="en-US" sz="1000" dirty="0" smtClean="0"/>
+                        <a:t>basics</a:t>
+                      </a:r>
+                      <a:endParaRPr lang="en-US" sz="1000" dirty="0"/>
+                    </a:p>
+                  </a:txBody>
+                  <a:tcPr marL="28932" marR="28932" marT="14466" marB="14466"/>
+                </a:tc>
+                <a:extLst>
+                  <a:ext uri="{0D108BD9-81ED-4DB2-BD59-A6C34878D82A}">
+                    <a16:rowId xmlns:a16="http://schemas.microsoft.com/office/drawing/2014/main" val="322122889"/>
+                  </a:ext>
+                </a:extLst>
+              </a:tr>
+              <a:tr h="183539">
+                <a:tc>
+                  <a:txBody>
+                    <a:bodyPr/>
+                    <a:lstStyle/>
+                    <a:p>
+                      <a:r>
+                        <a:rPr lang="en-US" sz="1000" dirty="0" err="1" smtClean="0"/>
+                        <a:t>tconst</a:t>
+                      </a:r>
+                      <a:endParaRPr lang="en-US" sz="1000" dirty="0" smtClean="0"/>
+                    </a:p>
+                  </a:txBody>
+                  <a:tcPr marL="28932" marR="28932" marT="14466" marB="14466"/>
+                </a:tc>
+                <a:extLst>
+                  <a:ext uri="{0D108BD9-81ED-4DB2-BD59-A6C34878D82A}">
+                    <a16:rowId xmlns:a16="http://schemas.microsoft.com/office/drawing/2014/main" val="2339044367"/>
+                  </a:ext>
+                </a:extLst>
+              </a:tr>
+              <a:tr h="183539">
+                <a:tc>
+                  <a:txBody>
+                    <a:bodyPr/>
+                    <a:lstStyle/>
+                    <a:p>
+                      <a:r>
+                        <a:rPr lang="en-US" sz="1000" dirty="0" err="1" smtClean="0"/>
+                        <a:t>titleType</a:t>
+                      </a:r>
+                      <a:endParaRPr lang="en-US" sz="1000" dirty="0"/>
+                    </a:p>
+                  </a:txBody>
+                  <a:tcPr marL="28932" marR="28932" marT="14466" marB="14466"/>
+                </a:tc>
+                <a:extLst>
+                  <a:ext uri="{0D108BD9-81ED-4DB2-BD59-A6C34878D82A}">
+                    <a16:rowId xmlns:a16="http://schemas.microsoft.com/office/drawing/2014/main" val="169551000"/>
+                  </a:ext>
+                </a:extLst>
+              </a:tr>
+              <a:tr h="200665">
+                <a:tc>
+                  <a:txBody>
+                    <a:bodyPr/>
+                    <a:lstStyle/>
+                    <a:p>
+                      <a:r>
+                        <a:rPr lang="en-US" sz="1000" dirty="0" err="1" smtClean="0"/>
+                        <a:t>primaryTitle</a:t>
+                      </a:r>
+                      <a:endParaRPr lang="en-US" sz="1000" dirty="0"/>
+                    </a:p>
+                  </a:txBody>
+                  <a:tcPr marL="28932" marR="28932" marT="14466" marB="14466"/>
+                </a:tc>
+                <a:extLst>
+                  <a:ext uri="{0D108BD9-81ED-4DB2-BD59-A6C34878D82A}">
+                    <a16:rowId xmlns:a16="http://schemas.microsoft.com/office/drawing/2014/main" val="1995829121"/>
+                  </a:ext>
+                </a:extLst>
+              </a:tr>
+              <a:tr h="185484">
+                <a:tc>
+                  <a:txBody>
+                    <a:bodyPr/>
+                    <a:lstStyle/>
+                    <a:p>
+                      <a:r>
+                        <a:rPr lang="en-US" sz="1000" dirty="0" err="1" smtClean="0"/>
+                        <a:t>originalTitle</a:t>
+                      </a:r>
+                      <a:endParaRPr lang="en-US" sz="1000" dirty="0"/>
+                    </a:p>
+                  </a:txBody>
+                  <a:tcPr marL="28932" marR="28932" marT="14466" marB="14466"/>
+                </a:tc>
+                <a:extLst>
+                  <a:ext uri="{0D108BD9-81ED-4DB2-BD59-A6C34878D82A}">
+                    <a16:rowId xmlns:a16="http://schemas.microsoft.com/office/drawing/2014/main" val="880397440"/>
+                  </a:ext>
+                </a:extLst>
+              </a:tr>
+              <a:tr h="183539">
+                <a:tc>
+                  <a:txBody>
+                    <a:bodyPr/>
+                    <a:lstStyle/>
+                    <a:p>
+                      <a:r>
+                        <a:rPr lang="en-US" sz="1000" dirty="0" err="1" smtClean="0"/>
+                        <a:t>isAdult</a:t>
+                      </a:r>
+                      <a:endParaRPr lang="en-US" sz="1000" dirty="0"/>
+                    </a:p>
+                  </a:txBody>
+                  <a:tcPr marL="28932" marR="28932" marT="14466" marB="14466"/>
+                </a:tc>
+                <a:extLst>
+                  <a:ext uri="{0D108BD9-81ED-4DB2-BD59-A6C34878D82A}">
+                    <a16:rowId xmlns:a16="http://schemas.microsoft.com/office/drawing/2014/main" val="2540927169"/>
+                  </a:ext>
+                </a:extLst>
+              </a:tr>
+              <a:tr h="183539">
+                <a:tc>
+                  <a:txBody>
+                    <a:bodyPr/>
+                    <a:lstStyle/>
+                    <a:p>
+                      <a:r>
+                        <a:rPr lang="en-US" sz="1000" dirty="0" err="1" smtClean="0"/>
+                        <a:t>startYear</a:t>
+                      </a:r>
+                      <a:endParaRPr lang="en-US" sz="1000" dirty="0"/>
+                    </a:p>
+                  </a:txBody>
+                  <a:tcPr marL="28932" marR="28932" marT="14466" marB="14466"/>
+                </a:tc>
+                <a:extLst>
+                  <a:ext uri="{0D108BD9-81ED-4DB2-BD59-A6C34878D82A}">
+                    <a16:rowId xmlns:a16="http://schemas.microsoft.com/office/drawing/2014/main" val="471773369"/>
+                  </a:ext>
+                </a:extLst>
+              </a:tr>
+              <a:tr h="183539">
+                <a:tc>
+                  <a:txBody>
+                    <a:bodyPr/>
+                    <a:lstStyle/>
+                    <a:p>
+                      <a:r>
+                        <a:rPr lang="en-US" sz="1000" dirty="0" err="1" smtClean="0"/>
+                        <a:t>endYear</a:t>
+                      </a:r>
+                      <a:endParaRPr lang="en-US" sz="1000" dirty="0"/>
+                    </a:p>
+                  </a:txBody>
+                  <a:tcPr marL="28932" marR="28932" marT="14466" marB="14466"/>
+                </a:tc>
+                <a:extLst>
+                  <a:ext uri="{0D108BD9-81ED-4DB2-BD59-A6C34878D82A}">
+                    <a16:rowId xmlns:a16="http://schemas.microsoft.com/office/drawing/2014/main" val="2138710157"/>
+                  </a:ext>
+                </a:extLst>
+              </a:tr>
+              <a:tr h="191005">
+                <a:tc>
+                  <a:txBody>
+                    <a:bodyPr/>
+                    <a:lstStyle/>
+                    <a:p>
+                      <a:r>
+                        <a:rPr lang="en-US" sz="1000" dirty="0" err="1" smtClean="0"/>
+                        <a:t>runtimeMinutes</a:t>
+                      </a:r>
+                      <a:endParaRPr lang="en-US" sz="1000" dirty="0"/>
+                    </a:p>
+                  </a:txBody>
+                  <a:tcPr marL="28932" marR="28932" marT="14466" marB="14466"/>
+                </a:tc>
+                <a:extLst>
+                  <a:ext uri="{0D108BD9-81ED-4DB2-BD59-A6C34878D82A}">
+                    <a16:rowId xmlns:a16="http://schemas.microsoft.com/office/drawing/2014/main" val="1283206302"/>
+                  </a:ext>
+                </a:extLst>
+              </a:tr>
+              <a:tr h="183539">
+                <a:tc>
+                  <a:txBody>
+                    <a:bodyPr/>
+                    <a:lstStyle/>
+                    <a:p>
+                      <a:r>
+                        <a:rPr lang="en-US" sz="1000" dirty="0" smtClean="0"/>
+                        <a:t>genres</a:t>
+                      </a:r>
+                      <a:endParaRPr lang="en-US" sz="1000" dirty="0"/>
+                    </a:p>
+                  </a:txBody>
+                  <a:tcPr marL="28932" marR="28932" marT="14466" marB="14466"/>
+                </a:tc>
+                <a:extLst>
+                  <a:ext uri="{0D108BD9-81ED-4DB2-BD59-A6C34878D82A}">
+                    <a16:rowId xmlns:a16="http://schemas.microsoft.com/office/drawing/2014/main" val="1371588353"/>
+                  </a:ext>
+                </a:extLst>
+              </a:tr>
+            </a:tbl>
+          </a:graphicData>
+        </a:graphic>
+      </p:graphicFrame>
+      <p:graphicFrame>
+        <p:nvGraphicFramePr>
+          <p:cNvPr id="4" name="Table 3"/>
+          <p:cNvGraphicFramePr>
+            <a:graphicFrameLocks noGrp="1"/>
+          </p:cNvGraphicFramePr>
+          <p:nvPr>
+            <p:extLst>
+              <p:ext uri="{D42A27DB-BD31-4B8C-83A1-F6EECF244321}">
+                <p14:modId xmlns:p14="http://schemas.microsoft.com/office/powerpoint/2010/main" val="995113176"/>
+              </p:ext>
+            </p:extLst>
+          </p:nvPr>
+        </p:nvGraphicFramePr>
+        <p:xfrm>
+          <a:off x="3823404" y="1031305"/>
+          <a:ext cx="1071478" cy="733554"/>
+        </p:xfrm>
+        <a:graphic>
+          <a:graphicData uri="http://schemas.openxmlformats.org/drawingml/2006/table">
+            <a:tbl>
+              <a:tblPr firstRow="1" bandRow="1">
+                <a:tableStyleId>{5C22544A-7EE6-4342-B048-85BDC9FD1C3A}</a:tableStyleId>
+              </a:tblPr>
+              <a:tblGrid>
+                <a:gridCol w="1071478">
+                  <a:extLst>
+                    <a:ext uri="{9D8B030D-6E8A-4147-A177-3AD203B41FA5}">
+                      <a16:colId xmlns:a16="http://schemas.microsoft.com/office/drawing/2014/main" val="1670824812"/>
+                    </a:ext>
+                  </a:extLst>
+                </a:gridCol>
+              </a:tblGrid>
+              <a:tr h="183238">
+                <a:tc>
+                  <a:txBody>
+                    <a:bodyPr/>
+                    <a:lstStyle/>
+                    <a:p>
+                      <a:r>
+                        <a:rPr lang="en-US" sz="1000" dirty="0" smtClean="0"/>
+                        <a:t>ratings</a:t>
+                      </a:r>
+                      <a:endParaRPr lang="en-US" sz="1000" dirty="0"/>
+                    </a:p>
+                  </a:txBody>
+                  <a:tcPr marL="28932" marR="28932" marT="14466" marB="14466"/>
+                </a:tc>
+                <a:extLst>
+                  <a:ext uri="{0D108BD9-81ED-4DB2-BD59-A6C34878D82A}">
+                    <a16:rowId xmlns:a16="http://schemas.microsoft.com/office/drawing/2014/main" val="322122889"/>
+                  </a:ext>
+                </a:extLst>
+              </a:tr>
+              <a:tr h="183539">
+                <a:tc>
+                  <a:txBody>
+                    <a:bodyPr/>
+                    <a:lstStyle/>
+                    <a:p>
+                      <a:r>
+                        <a:rPr lang="en-US" sz="1000" dirty="0" err="1" smtClean="0"/>
+                        <a:t>tconst</a:t>
+                      </a:r>
+                      <a:endParaRPr lang="en-US" sz="1000" dirty="0" smtClean="0"/>
+                    </a:p>
+                  </a:txBody>
+                  <a:tcPr marL="28932" marR="28932" marT="14466" marB="14466"/>
+                </a:tc>
+                <a:extLst>
+                  <a:ext uri="{0D108BD9-81ED-4DB2-BD59-A6C34878D82A}">
+                    <a16:rowId xmlns:a16="http://schemas.microsoft.com/office/drawing/2014/main" val="2339044367"/>
+                  </a:ext>
+                </a:extLst>
+              </a:tr>
+              <a:tr h="183238">
+                <a:tc>
+                  <a:txBody>
+                    <a:bodyPr/>
+                    <a:lstStyle/>
+                    <a:p>
+                      <a:r>
+                        <a:rPr lang="en-US" sz="1000" dirty="0" err="1" smtClean="0"/>
+                        <a:t>averageRating</a:t>
+                      </a:r>
+                      <a:endParaRPr lang="en-US" sz="1000" dirty="0"/>
+                    </a:p>
+                  </a:txBody>
+                  <a:tcPr marL="28932" marR="28932" marT="14466" marB="14466"/>
+                </a:tc>
+                <a:extLst>
+                  <a:ext uri="{0D108BD9-81ED-4DB2-BD59-A6C34878D82A}">
+                    <a16:rowId xmlns:a16="http://schemas.microsoft.com/office/drawing/2014/main" val="169551000"/>
+                  </a:ext>
+                </a:extLst>
+              </a:tr>
+              <a:tr h="183539">
+                <a:tc>
+                  <a:txBody>
+                    <a:bodyPr/>
+                    <a:lstStyle/>
+                    <a:p>
+                      <a:r>
+                        <a:rPr lang="en-US" sz="1000" dirty="0" err="1" smtClean="0"/>
+                        <a:t>numVotes</a:t>
+                      </a:r>
+                      <a:endParaRPr lang="en-US" sz="1000" dirty="0" smtClean="0"/>
+                    </a:p>
+                  </a:txBody>
+                  <a:tcPr marL="28932" marR="28932" marT="14466" marB="14466"/>
+                </a:tc>
+                <a:extLst>
+                  <a:ext uri="{0D108BD9-81ED-4DB2-BD59-A6C34878D82A}">
+                    <a16:rowId xmlns:a16="http://schemas.microsoft.com/office/drawing/2014/main" val="1995829121"/>
+                  </a:ext>
+                </a:extLst>
+              </a:tr>
+            </a:tbl>
+          </a:graphicData>
+        </a:graphic>
+      </p:graphicFrame>
+      <p:graphicFrame>
+        <p:nvGraphicFramePr>
+          <p:cNvPr id="5" name="Table 4"/>
+          <p:cNvGraphicFramePr>
+            <a:graphicFrameLocks noGrp="1"/>
+          </p:cNvGraphicFramePr>
+          <p:nvPr>
+            <p:extLst>
+              <p:ext uri="{D42A27DB-BD31-4B8C-83A1-F6EECF244321}">
+                <p14:modId xmlns:p14="http://schemas.microsoft.com/office/powerpoint/2010/main" val="3128048208"/>
+              </p:ext>
+            </p:extLst>
+          </p:nvPr>
+        </p:nvGraphicFramePr>
+        <p:xfrm>
+          <a:off x="3823404" y="3111423"/>
+          <a:ext cx="1058533" cy="1284472"/>
+        </p:xfrm>
+        <a:graphic>
+          <a:graphicData uri="http://schemas.openxmlformats.org/drawingml/2006/table">
+            <a:tbl>
+              <a:tblPr firstRow="1" bandRow="1">
+                <a:tableStyleId>{5C22544A-7EE6-4342-B048-85BDC9FD1C3A}</a:tableStyleId>
+              </a:tblPr>
+              <a:tblGrid>
+                <a:gridCol w="1058533">
+                  <a:extLst>
+                    <a:ext uri="{9D8B030D-6E8A-4147-A177-3AD203B41FA5}">
+                      <a16:colId xmlns:a16="http://schemas.microsoft.com/office/drawing/2014/main" val="1670824812"/>
+                    </a:ext>
+                  </a:extLst>
+                </a:gridCol>
+              </a:tblGrid>
+              <a:tr h="183238">
+                <a:tc>
+                  <a:txBody>
+                    <a:bodyPr/>
+                    <a:lstStyle/>
+                    <a:p>
+                      <a:r>
+                        <a:rPr lang="en-US" sz="1000" dirty="0" smtClean="0"/>
+                        <a:t>principals</a:t>
+                      </a:r>
+                      <a:endParaRPr lang="en-US" sz="1000" dirty="0"/>
+                    </a:p>
+                  </a:txBody>
+                  <a:tcPr marL="28932" marR="28932" marT="14466" marB="14466"/>
+                </a:tc>
+                <a:extLst>
+                  <a:ext uri="{0D108BD9-81ED-4DB2-BD59-A6C34878D82A}">
+                    <a16:rowId xmlns:a16="http://schemas.microsoft.com/office/drawing/2014/main" val="322122889"/>
+                  </a:ext>
+                </a:extLst>
+              </a:tr>
+              <a:tr h="183539">
+                <a:tc>
+                  <a:txBody>
+                    <a:bodyPr/>
+                    <a:lstStyle/>
+                    <a:p>
+                      <a:r>
+                        <a:rPr lang="en-US" sz="1000" dirty="0" err="1" smtClean="0"/>
+                        <a:t>tconst</a:t>
+                      </a:r>
+                      <a:endParaRPr lang="en-US" sz="1000" dirty="0" smtClean="0"/>
+                    </a:p>
+                  </a:txBody>
+                  <a:tcPr marL="28932" marR="28932" marT="14466" marB="14466"/>
+                </a:tc>
+                <a:extLst>
+                  <a:ext uri="{0D108BD9-81ED-4DB2-BD59-A6C34878D82A}">
+                    <a16:rowId xmlns:a16="http://schemas.microsoft.com/office/drawing/2014/main" val="2339044367"/>
+                  </a:ext>
+                </a:extLst>
+              </a:tr>
+              <a:tr h="183539">
+                <a:tc>
+                  <a:txBody>
+                    <a:bodyPr/>
+                    <a:lstStyle/>
+                    <a:p>
+                      <a:r>
+                        <a:rPr lang="en-US" sz="1000" dirty="0" smtClean="0"/>
+                        <a:t>ordering</a:t>
+                      </a:r>
+                      <a:endParaRPr lang="en-US" sz="1000" dirty="0"/>
+                    </a:p>
+                  </a:txBody>
+                  <a:tcPr marL="28932" marR="28932" marT="14466" marB="14466"/>
+                </a:tc>
+                <a:extLst>
+                  <a:ext uri="{0D108BD9-81ED-4DB2-BD59-A6C34878D82A}">
+                    <a16:rowId xmlns:a16="http://schemas.microsoft.com/office/drawing/2014/main" val="169551000"/>
+                  </a:ext>
+                </a:extLst>
+              </a:tr>
+              <a:tr h="183539">
+                <a:tc>
+                  <a:txBody>
+                    <a:bodyPr/>
+                    <a:lstStyle/>
+                    <a:p>
+                      <a:r>
+                        <a:rPr lang="en-US" sz="1000" dirty="0" err="1" smtClean="0"/>
+                        <a:t>nconst</a:t>
+                      </a:r>
+                      <a:endParaRPr lang="en-US" sz="1000" dirty="0"/>
+                    </a:p>
+                  </a:txBody>
+                  <a:tcPr marL="28932" marR="28932" marT="14466" marB="14466"/>
+                </a:tc>
+                <a:extLst>
+                  <a:ext uri="{0D108BD9-81ED-4DB2-BD59-A6C34878D82A}">
+                    <a16:rowId xmlns:a16="http://schemas.microsoft.com/office/drawing/2014/main" val="1995829121"/>
+                  </a:ext>
+                </a:extLst>
+              </a:tr>
+              <a:tr h="183539">
+                <a:tc>
+                  <a:txBody>
+                    <a:bodyPr/>
+                    <a:lstStyle/>
+                    <a:p>
+                      <a:r>
+                        <a:rPr lang="en-US" sz="1000" dirty="0" smtClean="0"/>
+                        <a:t>category</a:t>
+                      </a:r>
+                      <a:endParaRPr lang="en-US" sz="1000" dirty="0"/>
+                    </a:p>
+                  </a:txBody>
+                  <a:tcPr marL="28932" marR="28932" marT="14466" marB="14466"/>
+                </a:tc>
+                <a:extLst>
+                  <a:ext uri="{0D108BD9-81ED-4DB2-BD59-A6C34878D82A}">
+                    <a16:rowId xmlns:a16="http://schemas.microsoft.com/office/drawing/2014/main" val="880397440"/>
+                  </a:ext>
+                </a:extLst>
+              </a:tr>
+              <a:tr h="183539">
+                <a:tc>
+                  <a:txBody>
+                    <a:bodyPr/>
+                    <a:lstStyle/>
+                    <a:p>
+                      <a:r>
+                        <a:rPr lang="en-US" sz="1000" dirty="0" smtClean="0"/>
+                        <a:t>job</a:t>
+                      </a:r>
+                      <a:endParaRPr lang="en-US" sz="1000" dirty="0"/>
+                    </a:p>
+                  </a:txBody>
+                  <a:tcPr marL="28932" marR="28932" marT="14466" marB="14466"/>
+                </a:tc>
+                <a:extLst>
+                  <a:ext uri="{0D108BD9-81ED-4DB2-BD59-A6C34878D82A}">
+                    <a16:rowId xmlns:a16="http://schemas.microsoft.com/office/drawing/2014/main" val="2540927169"/>
+                  </a:ext>
+                </a:extLst>
+              </a:tr>
+              <a:tr h="183539">
+                <a:tc>
+                  <a:txBody>
+                    <a:bodyPr/>
+                    <a:lstStyle/>
+                    <a:p>
+                      <a:r>
+                        <a:rPr lang="en-US" sz="1000" dirty="0" smtClean="0"/>
+                        <a:t>characters</a:t>
+                      </a:r>
+                      <a:endParaRPr lang="en-US" sz="1000" dirty="0"/>
+                    </a:p>
+                  </a:txBody>
+                  <a:tcPr marL="28932" marR="28932" marT="14466" marB="14466"/>
+                </a:tc>
+                <a:extLst>
+                  <a:ext uri="{0D108BD9-81ED-4DB2-BD59-A6C34878D82A}">
+                    <a16:rowId xmlns:a16="http://schemas.microsoft.com/office/drawing/2014/main" val="471773369"/>
+                  </a:ext>
+                </a:extLst>
+              </a:tr>
+            </a:tbl>
+          </a:graphicData>
+        </a:graphic>
+      </p:graphicFrame>
+      <p:graphicFrame>
+        <p:nvGraphicFramePr>
+          <p:cNvPr id="7" name="Table 6"/>
+          <p:cNvGraphicFramePr>
+            <a:graphicFrameLocks noGrp="1"/>
+          </p:cNvGraphicFramePr>
+          <p:nvPr>
+            <p:extLst>
+              <p:ext uri="{D42A27DB-BD31-4B8C-83A1-F6EECF244321}">
+                <p14:modId xmlns:p14="http://schemas.microsoft.com/office/powerpoint/2010/main" val="2194703544"/>
+              </p:ext>
+            </p:extLst>
+          </p:nvPr>
+        </p:nvGraphicFramePr>
+        <p:xfrm>
+          <a:off x="5175775" y="1927775"/>
+          <a:ext cx="1065005" cy="1284773"/>
+        </p:xfrm>
+        <a:graphic>
+          <a:graphicData uri="http://schemas.openxmlformats.org/drawingml/2006/table">
+            <a:tbl>
+              <a:tblPr firstRow="1" bandRow="1">
+                <a:tableStyleId>{5C22544A-7EE6-4342-B048-85BDC9FD1C3A}</a:tableStyleId>
+              </a:tblPr>
+              <a:tblGrid>
+                <a:gridCol w="1065005">
+                  <a:extLst>
+                    <a:ext uri="{9D8B030D-6E8A-4147-A177-3AD203B41FA5}">
+                      <a16:colId xmlns:a16="http://schemas.microsoft.com/office/drawing/2014/main" val="1670824812"/>
+                    </a:ext>
+                  </a:extLst>
+                </a:gridCol>
+              </a:tblGrid>
+              <a:tr h="183539">
+                <a:tc>
+                  <a:txBody>
+                    <a:bodyPr/>
+                    <a:lstStyle/>
+                    <a:p>
+                      <a:r>
+                        <a:rPr lang="en-US" sz="1000" dirty="0" smtClean="0"/>
+                        <a:t>gross</a:t>
+                      </a:r>
+                      <a:endParaRPr lang="en-US" sz="1000" dirty="0"/>
+                    </a:p>
+                  </a:txBody>
+                  <a:tcPr marL="28932" marR="28932" marT="14466" marB="14466"/>
+                </a:tc>
+                <a:extLst>
+                  <a:ext uri="{0D108BD9-81ED-4DB2-BD59-A6C34878D82A}">
+                    <a16:rowId xmlns:a16="http://schemas.microsoft.com/office/drawing/2014/main" val="322122889"/>
+                  </a:ext>
+                </a:extLst>
+              </a:tr>
+              <a:tr h="183539">
+                <a:tc>
+                  <a:txBody>
+                    <a:bodyPr/>
+                    <a:lstStyle/>
+                    <a:p>
+                      <a:r>
+                        <a:rPr lang="en-US" sz="1000" dirty="0" err="1" smtClean="0"/>
+                        <a:t>tconst</a:t>
+                      </a:r>
+                      <a:endParaRPr lang="en-US" sz="1000" dirty="0" smtClean="0"/>
+                    </a:p>
+                  </a:txBody>
+                  <a:tcPr marL="28932" marR="28932" marT="14466" marB="14466"/>
+                </a:tc>
+                <a:extLst>
+                  <a:ext uri="{0D108BD9-81ED-4DB2-BD59-A6C34878D82A}">
+                    <a16:rowId xmlns:a16="http://schemas.microsoft.com/office/drawing/2014/main" val="2339044367"/>
+                  </a:ext>
+                </a:extLst>
+              </a:tr>
+              <a:tr h="183539">
+                <a:tc>
+                  <a:txBody>
+                    <a:bodyPr/>
+                    <a:lstStyle/>
+                    <a:p>
+                      <a:r>
+                        <a:rPr lang="en-US" sz="1000" dirty="0" smtClean="0"/>
+                        <a:t>title</a:t>
+                      </a:r>
+                      <a:endParaRPr lang="en-US" sz="1000" dirty="0"/>
+                    </a:p>
+                  </a:txBody>
+                  <a:tcPr marL="28932" marR="28932" marT="14466" marB="14466"/>
+                </a:tc>
+                <a:extLst>
+                  <a:ext uri="{0D108BD9-81ED-4DB2-BD59-A6C34878D82A}">
+                    <a16:rowId xmlns:a16="http://schemas.microsoft.com/office/drawing/2014/main" val="169551000"/>
+                  </a:ext>
+                </a:extLst>
+              </a:tr>
+              <a:tr h="183539">
+                <a:tc>
+                  <a:txBody>
+                    <a:bodyPr/>
+                    <a:lstStyle/>
+                    <a:p>
+                      <a:r>
+                        <a:rPr lang="en-US" sz="1000" dirty="0" err="1" smtClean="0"/>
+                        <a:t>adj_lifetime_gross</a:t>
+                      </a:r>
+                      <a:endParaRPr lang="en-US" sz="1000" dirty="0"/>
+                    </a:p>
+                  </a:txBody>
+                  <a:tcPr marL="28932" marR="28932" marT="14466" marB="14466"/>
+                </a:tc>
+                <a:extLst>
+                  <a:ext uri="{0D108BD9-81ED-4DB2-BD59-A6C34878D82A}">
+                    <a16:rowId xmlns:a16="http://schemas.microsoft.com/office/drawing/2014/main" val="1995829121"/>
+                  </a:ext>
+                </a:extLst>
+              </a:tr>
+              <a:tr h="183539">
+                <a:tc>
+                  <a:txBody>
+                    <a:bodyPr/>
+                    <a:lstStyle/>
+                    <a:p>
+                      <a:r>
+                        <a:rPr lang="en-US" sz="1000" dirty="0" err="1" smtClean="0"/>
+                        <a:t>lifetime_gross</a:t>
+                      </a:r>
+                      <a:endParaRPr lang="en-US" sz="1000" dirty="0"/>
+                    </a:p>
+                  </a:txBody>
+                  <a:tcPr marL="28932" marR="28932" marT="14466" marB="14466"/>
+                </a:tc>
+                <a:extLst>
+                  <a:ext uri="{0D108BD9-81ED-4DB2-BD59-A6C34878D82A}">
+                    <a16:rowId xmlns:a16="http://schemas.microsoft.com/office/drawing/2014/main" val="768215635"/>
+                  </a:ext>
+                </a:extLst>
+              </a:tr>
+              <a:tr h="183539">
+                <a:tc>
+                  <a:txBody>
+                    <a:bodyPr/>
+                    <a:lstStyle/>
+                    <a:p>
+                      <a:r>
+                        <a:rPr lang="en-US" sz="1000" dirty="0" err="1" smtClean="0"/>
+                        <a:t>est_num_tickets</a:t>
+                      </a:r>
+                      <a:endParaRPr lang="en-US" sz="1000" dirty="0"/>
+                    </a:p>
+                  </a:txBody>
+                  <a:tcPr marL="28932" marR="28932" marT="14466" marB="14466"/>
+                </a:tc>
+                <a:extLst>
+                  <a:ext uri="{0D108BD9-81ED-4DB2-BD59-A6C34878D82A}">
+                    <a16:rowId xmlns:a16="http://schemas.microsoft.com/office/drawing/2014/main" val="4018245193"/>
+                  </a:ext>
+                </a:extLst>
+              </a:tr>
+              <a:tr h="183539">
+                <a:tc>
+                  <a:txBody>
+                    <a:bodyPr/>
+                    <a:lstStyle/>
+                    <a:p>
+                      <a:r>
+                        <a:rPr lang="en-US" sz="1000" dirty="0" smtClean="0"/>
+                        <a:t>year</a:t>
+                      </a:r>
+                      <a:endParaRPr lang="en-US" sz="1000" dirty="0"/>
+                    </a:p>
+                  </a:txBody>
+                  <a:tcPr marL="28932" marR="28932" marT="14466" marB="14466"/>
+                </a:tc>
+                <a:extLst>
+                  <a:ext uri="{0D108BD9-81ED-4DB2-BD59-A6C34878D82A}">
+                    <a16:rowId xmlns:a16="http://schemas.microsoft.com/office/drawing/2014/main" val="308680816"/>
+                  </a:ext>
+                </a:extLst>
+              </a:tr>
+            </a:tbl>
+          </a:graphicData>
+        </a:graphic>
+      </p:graphicFrame>
+      <p:cxnSp>
+        <p:nvCxnSpPr>
+          <p:cNvPr id="36" name="Straight Connector 35"/>
+          <p:cNvCxnSpPr/>
+          <p:nvPr/>
+        </p:nvCxnSpPr>
+        <p:spPr>
+          <a:xfrm flipH="1" flipV="1">
+            <a:off x="3161553" y="1840753"/>
+            <a:ext cx="561790" cy="1559458"/>
+          </a:xfrm>
+          <a:prstGeom prst="line">
+            <a:avLst/>
+          </a:prstGeom>
+          <a:ln w="38100">
+            <a:solidFill>
+              <a:srgbClr val="5B9BD5"/>
+            </a:solidFill>
+            <a:headEnd type="oval" w="med" len="med"/>
+            <a:tailEnd type="oval" w="med" len="med"/>
+          </a:ln>
+        </p:spPr>
+        <p:style>
+          <a:lnRef idx="1">
+            <a:schemeClr val="accent1"/>
+          </a:lnRef>
+          <a:fillRef idx="0">
+            <a:schemeClr val="accent1"/>
+          </a:fillRef>
+          <a:effectRef idx="0">
+            <a:schemeClr val="accent1"/>
+          </a:effectRef>
+          <a:fontRef idx="minor">
+            <a:schemeClr val="tx1"/>
+          </a:fontRef>
+        </p:style>
+      </p:cxnSp>
+      <p:cxnSp>
+        <p:nvCxnSpPr>
+          <p:cNvPr id="39" name="Straight Connector 38"/>
+          <p:cNvCxnSpPr/>
+          <p:nvPr/>
+        </p:nvCxnSpPr>
+        <p:spPr>
+          <a:xfrm flipH="1" flipV="1">
+            <a:off x="3723344" y="1320801"/>
+            <a:ext cx="4295" cy="2067458"/>
+          </a:xfrm>
+          <a:prstGeom prst="line">
+            <a:avLst/>
+          </a:prstGeom>
+          <a:ln w="38100">
+            <a:solidFill>
+              <a:srgbClr val="5B9BD5"/>
+            </a:solidFill>
+            <a:headEnd type="oval" w="med" len="med"/>
+            <a:tailEnd type="oval" w="med" len="med"/>
+          </a:ln>
+        </p:spPr>
+        <p:style>
+          <a:lnRef idx="1">
+            <a:schemeClr val="accent1"/>
+          </a:lnRef>
+          <a:fillRef idx="0">
+            <a:schemeClr val="accent1"/>
+          </a:fillRef>
+          <a:effectRef idx="0">
+            <a:schemeClr val="accent1"/>
+          </a:effectRef>
+          <a:fontRef idx="minor">
+            <a:schemeClr val="tx1"/>
+          </a:fontRef>
+        </p:style>
+      </p:cxnSp>
+      <p:cxnSp>
+        <p:nvCxnSpPr>
+          <p:cNvPr id="47" name="Straight Connector 46"/>
+          <p:cNvCxnSpPr/>
+          <p:nvPr/>
+        </p:nvCxnSpPr>
+        <p:spPr>
+          <a:xfrm flipV="1">
+            <a:off x="3161553" y="1320800"/>
+            <a:ext cx="561790" cy="519953"/>
+          </a:xfrm>
+          <a:prstGeom prst="line">
+            <a:avLst/>
+          </a:prstGeom>
+          <a:ln w="38100">
+            <a:solidFill>
+              <a:srgbClr val="5B9BD5"/>
+            </a:solidFill>
+            <a:headEnd type="oval" w="med" len="med"/>
+            <a:tailEnd type="oval" w="med" len="med"/>
+          </a:ln>
+        </p:spPr>
+        <p:style>
+          <a:lnRef idx="1">
+            <a:schemeClr val="accent1"/>
+          </a:lnRef>
+          <a:fillRef idx="0">
+            <a:schemeClr val="accent1"/>
+          </a:fillRef>
+          <a:effectRef idx="0">
+            <a:schemeClr val="accent1"/>
+          </a:effectRef>
+          <a:fontRef idx="minor">
+            <a:schemeClr val="tx1"/>
+          </a:fontRef>
+        </p:style>
+      </p:cxnSp>
+      <p:cxnSp>
+        <p:nvCxnSpPr>
+          <p:cNvPr id="50" name="Straight Connector 49"/>
+          <p:cNvCxnSpPr/>
+          <p:nvPr/>
+        </p:nvCxnSpPr>
+        <p:spPr>
+          <a:xfrm>
+            <a:off x="3161553" y="1840753"/>
+            <a:ext cx="1918447" cy="373268"/>
+          </a:xfrm>
+          <a:prstGeom prst="line">
+            <a:avLst/>
+          </a:prstGeom>
+          <a:ln w="38100">
+            <a:solidFill>
+              <a:srgbClr val="5B9BD5"/>
+            </a:solidFill>
+            <a:headEnd type="oval" w="med" len="med"/>
+            <a:tailEnd type="oval" w="med" len="med"/>
+          </a:ln>
+        </p:spPr>
+        <p:style>
+          <a:lnRef idx="1">
+            <a:schemeClr val="accent1"/>
+          </a:lnRef>
+          <a:fillRef idx="0">
+            <a:schemeClr val="accent1"/>
+          </a:fillRef>
+          <a:effectRef idx="0">
+            <a:schemeClr val="accent1"/>
+          </a:effectRef>
+          <a:fontRef idx="minor">
+            <a:schemeClr val="tx1"/>
+          </a:fontRef>
+        </p:style>
+      </p:cxnSp>
+      <p:sp>
+        <p:nvSpPr>
+          <p:cNvPr id="66" name="Freeform 65"/>
+          <p:cNvSpPr/>
+          <p:nvPr/>
+        </p:nvSpPr>
+        <p:spPr>
+          <a:xfrm>
+            <a:off x="3610618" y="1332753"/>
+            <a:ext cx="1469382" cy="962600"/>
+          </a:xfrm>
+          <a:custGeom>
+            <a:avLst/>
+            <a:gdLst>
+              <a:gd name="connsiteX0" fmla="*/ 1744300 w 1744300"/>
+              <a:gd name="connsiteY0" fmla="*/ 890494 h 962600"/>
+              <a:gd name="connsiteX1" fmla="*/ 178464 w 1744300"/>
+              <a:gd name="connsiteY1" fmla="*/ 872565 h 962600"/>
+              <a:gd name="connsiteX2" fmla="*/ 100770 w 1744300"/>
+              <a:gd name="connsiteY2" fmla="*/ 0 h 962600"/>
+            </a:gdLst>
+            <a:ahLst/>
+            <a:cxnLst>
+              <a:cxn ang="0">
+                <a:pos x="connsiteX0" y="connsiteY0"/>
+              </a:cxn>
+              <a:cxn ang="0">
+                <a:pos x="connsiteX1" y="connsiteY1"/>
+              </a:cxn>
+              <a:cxn ang="0">
+                <a:pos x="connsiteX2" y="connsiteY2"/>
+              </a:cxn>
+            </a:cxnLst>
+            <a:rect l="l" t="t" r="r" b="b"/>
+            <a:pathLst>
+              <a:path w="1744300" h="962600">
+                <a:moveTo>
+                  <a:pt x="1744300" y="890494"/>
+                </a:moveTo>
+                <a:cubicBezTo>
+                  <a:pt x="1098343" y="955737"/>
+                  <a:pt x="452386" y="1020981"/>
+                  <a:pt x="178464" y="872565"/>
+                </a:cubicBezTo>
+                <a:cubicBezTo>
+                  <a:pt x="-95458" y="724149"/>
+                  <a:pt x="2656" y="362074"/>
+                  <a:pt x="100770" y="0"/>
+                </a:cubicBezTo>
+              </a:path>
+            </a:pathLst>
+          </a:custGeom>
+          <a:noFill/>
+          <a:ln w="38100">
+            <a:solidFill>
+              <a:srgbClr val="5B9BD5"/>
+            </a:solidFill>
+            <a:headEnd type="oval" w="med" len="med"/>
+            <a:tailEnd type="oval" w="med" len="med"/>
+          </a:ln>
+        </p:spPr>
+        <p:style>
+          <a:lnRef idx="2">
+            <a:schemeClr val="accent1">
+              <a:shade val="50000"/>
+            </a:schemeClr>
+          </a:lnRef>
+          <a:fillRef idx="1">
+            <a:schemeClr val="accent1"/>
+          </a:fillRef>
+          <a:effectRef idx="0">
+            <a:schemeClr val="accent1"/>
+          </a:effectRef>
+          <a:fontRef idx="minor">
+            <a:schemeClr val="lt1"/>
+          </a:fontRef>
+        </p:style>
+        <p:txBody>
+          <a:bodyPr rtlCol="0" anchor="ctr"/>
+          <a:lstStyle/>
+          <a:p>
+            <a:pPr algn="ctr"/>
+            <a:endParaRPr lang="en-US"/>
+          </a:p>
+        </p:txBody>
+      </p:sp>
+      <p:sp>
+        <p:nvSpPr>
+          <p:cNvPr id="67" name="Freeform 66"/>
+          <p:cNvSpPr/>
+          <p:nvPr/>
+        </p:nvSpPr>
+        <p:spPr>
+          <a:xfrm>
+            <a:off x="3504714" y="2225974"/>
+            <a:ext cx="1575286" cy="1174238"/>
+          </a:xfrm>
+          <a:custGeom>
+            <a:avLst/>
+            <a:gdLst>
+              <a:gd name="connsiteX0" fmla="*/ 1832274 w 1832274"/>
+              <a:gd name="connsiteY0" fmla="*/ 0 h 1631576"/>
+              <a:gd name="connsiteX1" fmla="*/ 134957 w 1832274"/>
+              <a:gd name="connsiteY1" fmla="*/ 848658 h 1631576"/>
+              <a:gd name="connsiteX2" fmla="*/ 230580 w 1832274"/>
+              <a:gd name="connsiteY2" fmla="*/ 1631576 h 1631576"/>
+            </a:gdLst>
+            <a:ahLst/>
+            <a:cxnLst>
+              <a:cxn ang="0">
+                <a:pos x="connsiteX0" y="connsiteY0"/>
+              </a:cxn>
+              <a:cxn ang="0">
+                <a:pos x="connsiteX1" y="connsiteY1"/>
+              </a:cxn>
+              <a:cxn ang="0">
+                <a:pos x="connsiteX2" y="connsiteY2"/>
+              </a:cxn>
+            </a:cxnLst>
+            <a:rect l="l" t="t" r="r" b="b"/>
+            <a:pathLst>
+              <a:path w="1832274" h="1631576">
+                <a:moveTo>
+                  <a:pt x="1832274" y="0"/>
+                </a:moveTo>
+                <a:cubicBezTo>
+                  <a:pt x="1117090" y="288364"/>
+                  <a:pt x="401906" y="576729"/>
+                  <a:pt x="134957" y="848658"/>
+                </a:cubicBezTo>
+                <a:cubicBezTo>
+                  <a:pt x="-131992" y="1120587"/>
+                  <a:pt x="49294" y="1376081"/>
+                  <a:pt x="230580" y="1631576"/>
+                </a:cubicBezTo>
+              </a:path>
+            </a:pathLst>
+          </a:custGeom>
+          <a:noFill/>
+          <a:ln w="38100">
+            <a:solidFill>
+              <a:srgbClr val="5B9BD5"/>
+            </a:solidFill>
+            <a:headEnd type="oval" w="med" len="med"/>
+            <a:tailEnd type="oval" w="med" len="med"/>
+          </a:ln>
+        </p:spPr>
+        <p:style>
+          <a:lnRef idx="2">
+            <a:schemeClr val="accent1">
+              <a:shade val="50000"/>
+            </a:schemeClr>
+          </a:lnRef>
+          <a:fillRef idx="1">
+            <a:schemeClr val="accent1"/>
+          </a:fillRef>
+          <a:effectRef idx="0">
+            <a:schemeClr val="accent1"/>
+          </a:effectRef>
+          <a:fontRef idx="minor">
+            <a:schemeClr val="lt1"/>
+          </a:fontRef>
+        </p:style>
+        <p:txBody>
+          <a:bodyPr rtlCol="0" anchor="ctr"/>
+          <a:lstStyle/>
+          <a:p>
+            <a:pPr algn="ctr"/>
+            <a:endParaRPr lang="en-US"/>
+          </a:p>
+        </p:txBody>
+      </p:sp>
+    </p:spTree>
+    <p:extLst>
+      <p:ext uri="{BB962C8B-B14F-4D97-AF65-F5344CB8AC3E}">
+        <p14:creationId xmlns:p14="http://schemas.microsoft.com/office/powerpoint/2010/main" val="3477456622"/>
       </p:ext>
     </p:extLst>
   </p:cSld>

</xml_diff>